<commit_message>
remove platform term from VEE overall schematic
and virtualization term
</commit_message>
<xml_diff>
--- a/overview/images/vee.pptx
+++ b/overview/images/vee.pptx
@@ -239,7 +239,7 @@
               <a:rPr lang="fr-FR" smtClean="0">
                 <a:latin typeface="Calibri Regular" charset="0"/>
               </a:rPr>
-              <a:t>novembre 22</a:t>
+              <a:t>avril 23</a:t>
             </a:fld>
             <a:endParaRPr lang="en-US" dirty="0">
               <a:latin typeface="Calibri Regular" charset="0"/>
@@ -418,7 +418,7 @@
             <a:fld id="{79958FA1-9FE8-F149-AB4B-7DC9950B39E9}" type="datetime6">
               <a:rPr lang="fr-FR" smtClean="0"/>
               <a:pPr/>
-              <a:t>novembre 22</a:t>
+              <a:t>avril 23</a:t>
             </a:fld>
             <a:endParaRPr lang="en-US" dirty="0"/>
           </a:p>
@@ -6257,7 +6257,7 @@
           <p:cNvPr id="14" name="Slide Number Placeholder 5">
             <a:extLst>
               <a:ext uri="{FF2B5EF4-FFF2-40B4-BE49-F238E27FC236}">
-                <a16:creationId xmlns="" xmlns:a16="http://schemas.microsoft.com/office/drawing/2014/main" id="{D6A5EA0A-9DA9-564F-8F7D-CF263DB84C39}"/>
+                <a16:creationId xmlns:a16="http://schemas.microsoft.com/office/drawing/2014/main" xmlns="" id="{D6A5EA0A-9DA9-564F-8F7D-CF263DB84C39}"/>
               </a:ext>
             </a:extLst>
           </p:cNvPr>
@@ -6425,7 +6425,7 @@
           <p:cNvPr id="21" name="Straight Connector 20">
             <a:extLst>
               <a:ext uri="{FF2B5EF4-FFF2-40B4-BE49-F238E27FC236}">
-                <a16:creationId xmlns="" xmlns:a16="http://schemas.microsoft.com/office/drawing/2014/main" id="{F4443C96-B82D-F449-A71B-02134B6BB207}"/>
+                <a16:creationId xmlns:a16="http://schemas.microsoft.com/office/drawing/2014/main" xmlns="" id="{F4443C96-B82D-F449-A71B-02134B6BB207}"/>
               </a:ext>
             </a:extLst>
           </p:cNvPr>
@@ -6936,7 +6936,7 @@
           <p:cNvPr id="75" name="Arc 74">
             <a:extLst>
               <a:ext uri="{FF2B5EF4-FFF2-40B4-BE49-F238E27FC236}">
-                <a16:creationId xmlns="" xmlns:a16="http://schemas.microsoft.com/office/drawing/2014/main" id="{060453BB-F2FC-A243-9739-B2863E6DCBA0}"/>
+                <a16:creationId xmlns:a16="http://schemas.microsoft.com/office/drawing/2014/main" xmlns="" id="{060453BB-F2FC-A243-9739-B2863E6DCBA0}"/>
               </a:ext>
             </a:extLst>
           </p:cNvPr>
@@ -6990,7 +6990,7 @@
           <p:cNvPr id="76" name="Arc 75">
             <a:extLst>
               <a:ext uri="{FF2B5EF4-FFF2-40B4-BE49-F238E27FC236}">
-                <a16:creationId xmlns="" xmlns:a16="http://schemas.microsoft.com/office/drawing/2014/main" id="{082EFA91-DD81-C447-8CF4-B191FF92FDC2}"/>
+                <a16:creationId xmlns:a16="http://schemas.microsoft.com/office/drawing/2014/main" xmlns="" id="{082EFA91-DD81-C447-8CF4-B191FF92FDC2}"/>
               </a:ext>
             </a:extLst>
           </p:cNvPr>
@@ -7044,7 +7044,7 @@
           <p:cNvPr id="77" name="Snip Same Side Corner Rectangle 76">
             <a:extLst>
               <a:ext uri="{FF2B5EF4-FFF2-40B4-BE49-F238E27FC236}">
-                <a16:creationId xmlns="" xmlns:a16="http://schemas.microsoft.com/office/drawing/2014/main" id="{93C230A8-43EB-B546-B305-CC8297598AE1}"/>
+                <a16:creationId xmlns:a16="http://schemas.microsoft.com/office/drawing/2014/main" xmlns="" id="{93C230A8-43EB-B546-B305-CC8297598AE1}"/>
               </a:ext>
             </a:extLst>
           </p:cNvPr>
@@ -7114,7 +7114,7 @@
           <p:cNvPr id="78" name="Rounded Rectangle 77">
             <a:extLst>
               <a:ext uri="{FF2B5EF4-FFF2-40B4-BE49-F238E27FC236}">
-                <a16:creationId xmlns="" xmlns:a16="http://schemas.microsoft.com/office/drawing/2014/main" id="{2AF5A412-FF36-A24E-9A06-0B5A1F78F311}"/>
+                <a16:creationId xmlns:a16="http://schemas.microsoft.com/office/drawing/2014/main" xmlns="" id="{2AF5A412-FF36-A24E-9A06-0B5A1F78F311}"/>
               </a:ext>
             </a:extLst>
           </p:cNvPr>
@@ -7184,7 +7184,7 @@
           <p:cNvPr id="79" name="Rounded Rectangle 78">
             <a:extLst>
               <a:ext uri="{FF2B5EF4-FFF2-40B4-BE49-F238E27FC236}">
-                <a16:creationId xmlns="" xmlns:a16="http://schemas.microsoft.com/office/drawing/2014/main" id="{E3377285-D0B9-EA42-A462-097A2767D60F}"/>
+                <a16:creationId xmlns:a16="http://schemas.microsoft.com/office/drawing/2014/main" xmlns="" id="{E3377285-D0B9-EA42-A462-097A2767D60F}"/>
               </a:ext>
             </a:extLst>
           </p:cNvPr>
@@ -7254,7 +7254,7 @@
           <p:cNvPr id="80" name="Rounded Rectangle 79">
             <a:extLst>
               <a:ext uri="{FF2B5EF4-FFF2-40B4-BE49-F238E27FC236}">
-                <a16:creationId xmlns="" xmlns:a16="http://schemas.microsoft.com/office/drawing/2014/main" id="{8D4F4F48-B4E3-A841-AF8E-407BA63037C3}"/>
+                <a16:creationId xmlns:a16="http://schemas.microsoft.com/office/drawing/2014/main" xmlns="" id="{8D4F4F48-B4E3-A841-AF8E-407BA63037C3}"/>
               </a:ext>
             </a:extLst>
           </p:cNvPr>
@@ -7345,7 +7345,7 @@
           <p:cNvPr id="81" name="Rounded Rectangle 80">
             <a:extLst>
               <a:ext uri="{FF2B5EF4-FFF2-40B4-BE49-F238E27FC236}">
-                <a16:creationId xmlns="" xmlns:a16="http://schemas.microsoft.com/office/drawing/2014/main" id="{7625AF1C-C148-7943-8936-2189C6B4B3C8}"/>
+                <a16:creationId xmlns:a16="http://schemas.microsoft.com/office/drawing/2014/main" xmlns="" id="{7625AF1C-C148-7943-8936-2189C6B4B3C8}"/>
               </a:ext>
             </a:extLst>
           </p:cNvPr>
@@ -7426,7 +7426,7 @@
           <p:cNvPr id="82" name="Rounded Rectangle 81">
             <a:extLst>
               <a:ext uri="{FF2B5EF4-FFF2-40B4-BE49-F238E27FC236}">
-                <a16:creationId xmlns="" xmlns:a16="http://schemas.microsoft.com/office/drawing/2014/main" id="{3F914E6A-E96D-D447-AA1C-252B914055B1}"/>
+                <a16:creationId xmlns:a16="http://schemas.microsoft.com/office/drawing/2014/main" xmlns="" id="{3F914E6A-E96D-D447-AA1C-252B914055B1}"/>
               </a:ext>
             </a:extLst>
           </p:cNvPr>
@@ -7496,7 +7496,7 @@
           <p:cNvPr id="83" name="Rounded Rectangle 370">
             <a:extLst>
               <a:ext uri="{FF2B5EF4-FFF2-40B4-BE49-F238E27FC236}">
-                <a16:creationId xmlns="" xmlns:a16="http://schemas.microsoft.com/office/drawing/2014/main" id="{F2B17FA4-3633-F343-9E0C-1B0CEF8E5B3E}"/>
+                <a16:creationId xmlns:a16="http://schemas.microsoft.com/office/drawing/2014/main" xmlns="" id="{F2B17FA4-3633-F343-9E0C-1B0CEF8E5B3E}"/>
               </a:ext>
             </a:extLst>
           </p:cNvPr>
@@ -8415,7 +8415,7 @@
           <p:cNvPr id="84" name="Group 83">
             <a:extLst>
               <a:ext uri="{FF2B5EF4-FFF2-40B4-BE49-F238E27FC236}">
-                <a16:creationId xmlns="" xmlns:a16="http://schemas.microsoft.com/office/drawing/2014/main" id="{38EBC114-77E9-E74E-8263-4DEE0623CD13}"/>
+                <a16:creationId xmlns:a16="http://schemas.microsoft.com/office/drawing/2014/main" xmlns="" id="{38EBC114-77E9-E74E-8263-4DEE0623CD13}"/>
               </a:ext>
             </a:extLst>
           </p:cNvPr>
@@ -8435,7 +8435,7 @@
             <p:cNvPr id="85" name="Rounded Rectangle 84">
               <a:extLst>
                 <a:ext uri="{FF2B5EF4-FFF2-40B4-BE49-F238E27FC236}">
-                  <a16:creationId xmlns="" xmlns:a16="http://schemas.microsoft.com/office/drawing/2014/main" id="{1F97F6F7-77E0-0744-80AE-76419C4BA8A7}"/>
+                  <a16:creationId xmlns:a16="http://schemas.microsoft.com/office/drawing/2014/main" xmlns="" id="{1F97F6F7-77E0-0744-80AE-76419C4BA8A7}"/>
                 </a:ext>
               </a:extLst>
             </p:cNvPr>
@@ -8498,7 +8498,7 @@
             <p:cNvPr id="86" name="Rectangle 85">
               <a:extLst>
                 <a:ext uri="{FF2B5EF4-FFF2-40B4-BE49-F238E27FC236}">
-                  <a16:creationId xmlns="" xmlns:a16="http://schemas.microsoft.com/office/drawing/2014/main" id="{5C3DCC1D-F078-D640-A72E-2F0C0F72E809}"/>
+                  <a16:creationId xmlns:a16="http://schemas.microsoft.com/office/drawing/2014/main" xmlns="" id="{5C3DCC1D-F078-D640-A72E-2F0C0F72E809}"/>
                 </a:ext>
               </a:extLst>
             </p:cNvPr>
@@ -8567,7 +8567,7 @@
             <p:cNvPr id="87" name="Picture 86">
               <a:extLst>
                 <a:ext uri="{FF2B5EF4-FFF2-40B4-BE49-F238E27FC236}">
-                  <a16:creationId xmlns="" xmlns:a16="http://schemas.microsoft.com/office/drawing/2014/main" id="{54856715-B090-974C-B91F-9F1B41C116E3}"/>
+                  <a16:creationId xmlns:a16="http://schemas.microsoft.com/office/drawing/2014/main" xmlns="" id="{54856715-B090-974C-B91F-9F1B41C116E3}"/>
                 </a:ext>
               </a:extLst>
             </p:cNvPr>
@@ -8605,7 +8605,7 @@
           <p:cNvPr id="88" name="Rounded Rectangle 87">
             <a:extLst>
               <a:ext uri="{FF2B5EF4-FFF2-40B4-BE49-F238E27FC236}">
-                <a16:creationId xmlns="" xmlns:a16="http://schemas.microsoft.com/office/drawing/2014/main" id="{7272F29D-12F7-594D-BF44-2046F7A6E308}"/>
+                <a16:creationId xmlns:a16="http://schemas.microsoft.com/office/drawing/2014/main" xmlns="" id="{7272F29D-12F7-594D-BF44-2046F7A6E308}"/>
               </a:ext>
             </a:extLst>
           </p:cNvPr>
@@ -8680,7 +8680,7 @@
           <p:cNvPr id="89" name="Rounded Rectangle 88">
             <a:extLst>
               <a:ext uri="{FF2B5EF4-FFF2-40B4-BE49-F238E27FC236}">
-                <a16:creationId xmlns="" xmlns:a16="http://schemas.microsoft.com/office/drawing/2014/main" id="{BA11B1EC-3CFC-3D48-B5A4-505052591809}"/>
+                <a16:creationId xmlns:a16="http://schemas.microsoft.com/office/drawing/2014/main" xmlns="" id="{BA11B1EC-3CFC-3D48-B5A4-505052591809}"/>
               </a:ext>
             </a:extLst>
           </p:cNvPr>
@@ -8742,7 +8742,7 @@
           <p:cNvPr id="90" name="TextBox 89">
             <a:extLst>
               <a:ext uri="{FF2B5EF4-FFF2-40B4-BE49-F238E27FC236}">
-                <a16:creationId xmlns="" xmlns:a16="http://schemas.microsoft.com/office/drawing/2014/main" id="{B73A4B38-C063-604A-A476-A4B0EB81C503}"/>
+                <a16:creationId xmlns:a16="http://schemas.microsoft.com/office/drawing/2014/main" xmlns="" id="{B73A4B38-C063-604A-A476-A4B0EB81C503}"/>
               </a:ext>
             </a:extLst>
           </p:cNvPr>
@@ -8793,7 +8793,7 @@
           <p:cNvPr id="91" name="Rounded Rectangle 90">
             <a:extLst>
               <a:ext uri="{FF2B5EF4-FFF2-40B4-BE49-F238E27FC236}">
-                <a16:creationId xmlns="" xmlns:a16="http://schemas.microsoft.com/office/drawing/2014/main" id="{ED404E0D-2795-B545-9375-BFB0E096DF34}"/>
+                <a16:creationId xmlns:a16="http://schemas.microsoft.com/office/drawing/2014/main" xmlns="" id="{ED404E0D-2795-B545-9375-BFB0E096DF34}"/>
               </a:ext>
             </a:extLst>
           </p:cNvPr>
@@ -8865,7 +8865,7 @@
           <p:cNvPr id="92" name="Rectangle 91">
             <a:extLst>
               <a:ext uri="{FF2B5EF4-FFF2-40B4-BE49-F238E27FC236}">
-                <a16:creationId xmlns="" xmlns:a16="http://schemas.microsoft.com/office/drawing/2014/main" id="{C6784975-6AC9-3B48-87AF-D23E163731B4}"/>
+                <a16:creationId xmlns:a16="http://schemas.microsoft.com/office/drawing/2014/main" xmlns="" id="{C6784975-6AC9-3B48-87AF-D23E163731B4}"/>
               </a:ext>
             </a:extLst>
           </p:cNvPr>
@@ -8916,7 +8916,7 @@
           <p:cNvPr id="93" name="Rounded Rectangle 92">
             <a:extLst>
               <a:ext uri="{FF2B5EF4-FFF2-40B4-BE49-F238E27FC236}">
-                <a16:creationId xmlns="" xmlns:a16="http://schemas.microsoft.com/office/drawing/2014/main" id="{33C5C744-2FA7-B748-B6C2-E72DF24B9D91}"/>
+                <a16:creationId xmlns:a16="http://schemas.microsoft.com/office/drawing/2014/main" xmlns="" id="{33C5C744-2FA7-B748-B6C2-E72DF24B9D91}"/>
               </a:ext>
             </a:extLst>
           </p:cNvPr>
@@ -8987,7 +8987,7 @@
           <p:cNvPr id="97" name="Group 96">
             <a:extLst>
               <a:ext uri="{FF2B5EF4-FFF2-40B4-BE49-F238E27FC236}">
-                <a16:creationId xmlns="" xmlns:a16="http://schemas.microsoft.com/office/drawing/2014/main" id="{5E2DAE89-A9BB-5C49-9AB6-C79F1DAEDE64}"/>
+                <a16:creationId xmlns:a16="http://schemas.microsoft.com/office/drawing/2014/main" xmlns="" id="{5E2DAE89-A9BB-5C49-9AB6-C79F1DAEDE64}"/>
               </a:ext>
             </a:extLst>
           </p:cNvPr>
@@ -9007,7 +9007,7 @@
             <p:cNvPr id="98" name="Rounded Rectangle 370">
               <a:extLst>
                 <a:ext uri="{FF2B5EF4-FFF2-40B4-BE49-F238E27FC236}">
-                  <a16:creationId xmlns="" xmlns:a16="http://schemas.microsoft.com/office/drawing/2014/main" id="{5706D4E4-A7C5-7F49-AB9B-9227A3278FCE}"/>
+                  <a16:creationId xmlns:a16="http://schemas.microsoft.com/office/drawing/2014/main" xmlns="" id="{5706D4E4-A7C5-7F49-AB9B-9227A3278FCE}"/>
                 </a:ext>
               </a:extLst>
             </p:cNvPr>
@@ -9926,7 +9926,7 @@
             <p:cNvPr id="99" name="Group 98">
               <a:extLst>
                 <a:ext uri="{FF2B5EF4-FFF2-40B4-BE49-F238E27FC236}">
-                  <a16:creationId xmlns="" xmlns:a16="http://schemas.microsoft.com/office/drawing/2014/main" id="{DED36E0C-22B4-8243-BE39-78DAEB6907B6}"/>
+                  <a16:creationId xmlns:a16="http://schemas.microsoft.com/office/drawing/2014/main" xmlns="" id="{DED36E0C-22B4-8243-BE39-78DAEB6907B6}"/>
                 </a:ext>
               </a:extLst>
             </p:cNvPr>
@@ -9946,7 +9946,7 @@
               <p:cNvPr id="100" name="Rounded Rectangle 99">
                 <a:extLst>
                   <a:ext uri="{FF2B5EF4-FFF2-40B4-BE49-F238E27FC236}">
-                    <a16:creationId xmlns="" xmlns:a16="http://schemas.microsoft.com/office/drawing/2014/main" id="{28E4897E-BFB0-C447-B1A1-C6E81F12FAB8}"/>
+                    <a16:creationId xmlns:a16="http://schemas.microsoft.com/office/drawing/2014/main" xmlns="" id="{28E4897E-BFB0-C447-B1A1-C6E81F12FAB8}"/>
                   </a:ext>
                 </a:extLst>
               </p:cNvPr>
@@ -10007,7 +10007,7 @@
               <p:cNvPr id="101" name="Group 100">
                 <a:extLst>
                   <a:ext uri="{FF2B5EF4-FFF2-40B4-BE49-F238E27FC236}">
-                    <a16:creationId xmlns="" xmlns:a16="http://schemas.microsoft.com/office/drawing/2014/main" id="{4F377B71-BB85-E84C-B24D-795DECA3A7C6}"/>
+                    <a16:creationId xmlns:a16="http://schemas.microsoft.com/office/drawing/2014/main" xmlns="" id="{4F377B71-BB85-E84C-B24D-795DECA3A7C6}"/>
                   </a:ext>
                 </a:extLst>
               </p:cNvPr>
@@ -10027,7 +10027,7 @@
                 <p:cNvPr id="102" name="Picture 101">
                   <a:extLst>
                     <a:ext uri="{FF2B5EF4-FFF2-40B4-BE49-F238E27FC236}">
-                      <a16:creationId xmlns="" xmlns:a16="http://schemas.microsoft.com/office/drawing/2014/main" id="{E564ED05-6EB8-8240-92EE-0244288AB3F5}"/>
+                      <a16:creationId xmlns:a16="http://schemas.microsoft.com/office/drawing/2014/main" xmlns="" id="{E564ED05-6EB8-8240-92EE-0244288AB3F5}"/>
                     </a:ext>
                   </a:extLst>
                 </p:cNvPr>
@@ -10063,7 +10063,7 @@
                 <p:cNvPr id="103" name="Picture 102">
                   <a:extLst>
                     <a:ext uri="{FF2B5EF4-FFF2-40B4-BE49-F238E27FC236}">
-                      <a16:creationId xmlns="" xmlns:a16="http://schemas.microsoft.com/office/drawing/2014/main" id="{B49F2F13-EC6A-1746-999F-3875CFB20DF3}"/>
+                      <a16:creationId xmlns:a16="http://schemas.microsoft.com/office/drawing/2014/main" xmlns="" id="{B49F2F13-EC6A-1746-999F-3875CFB20DF3}"/>
                     </a:ext>
                   </a:extLst>
                 </p:cNvPr>
@@ -10102,7 +10102,7 @@
           <p:cNvPr id="104" name="Rounded Rectangle 103">
             <a:extLst>
               <a:ext uri="{FF2B5EF4-FFF2-40B4-BE49-F238E27FC236}">
-                <a16:creationId xmlns="" xmlns:a16="http://schemas.microsoft.com/office/drawing/2014/main" id="{8DD58497-F07A-E746-9247-53C992B30583}"/>
+                <a16:creationId xmlns:a16="http://schemas.microsoft.com/office/drawing/2014/main" xmlns="" id="{8DD58497-F07A-E746-9247-53C992B30583}"/>
               </a:ext>
             </a:extLst>
           </p:cNvPr>
@@ -10177,7 +10177,7 @@
           <p:cNvPr id="105" name="TextBox 104">
             <a:extLst>
               <a:ext uri="{FF2B5EF4-FFF2-40B4-BE49-F238E27FC236}">
-                <a16:creationId xmlns="" xmlns:a16="http://schemas.microsoft.com/office/drawing/2014/main" id="{54B16BBA-07E7-D147-A0A6-FE706EAC5032}"/>
+                <a16:creationId xmlns:a16="http://schemas.microsoft.com/office/drawing/2014/main" xmlns="" id="{54B16BBA-07E7-D147-A0A6-FE706EAC5032}"/>
               </a:ext>
             </a:extLst>
           </p:cNvPr>
@@ -10238,7 +10238,7 @@
           <p:cNvPr id="106" name="Rounded Rectangle 105">
             <a:extLst>
               <a:ext uri="{FF2B5EF4-FFF2-40B4-BE49-F238E27FC236}">
-                <a16:creationId xmlns="" xmlns:a16="http://schemas.microsoft.com/office/drawing/2014/main" id="{BBF629A8-41B9-9449-920C-365EE36C4615}"/>
+                <a16:creationId xmlns:a16="http://schemas.microsoft.com/office/drawing/2014/main" xmlns="" id="{BBF629A8-41B9-9449-920C-365EE36C4615}"/>
               </a:ext>
             </a:extLst>
           </p:cNvPr>
@@ -10316,7 +10316,7 @@
           <p:cNvPr id="107" name="Round Same Side Corner Rectangle 106">
             <a:extLst>
               <a:ext uri="{FF2B5EF4-FFF2-40B4-BE49-F238E27FC236}">
-                <a16:creationId xmlns="" xmlns:a16="http://schemas.microsoft.com/office/drawing/2014/main" id="{DFAD3B07-BCF9-904D-B49C-F7F1DBBAE3F1}"/>
+                <a16:creationId xmlns:a16="http://schemas.microsoft.com/office/drawing/2014/main" xmlns="" id="{DFAD3B07-BCF9-904D-B49C-F7F1DBBAE3F1}"/>
               </a:ext>
             </a:extLst>
           </p:cNvPr>
@@ -10375,7 +10375,7 @@
           <p:cNvPr id="108" name="Rounded Rectangle 107">
             <a:extLst>
               <a:ext uri="{FF2B5EF4-FFF2-40B4-BE49-F238E27FC236}">
-                <a16:creationId xmlns="" xmlns:a16="http://schemas.microsoft.com/office/drawing/2014/main" id="{18D2E7C0-602F-D644-BE76-5AD87004495C}"/>
+                <a16:creationId xmlns:a16="http://schemas.microsoft.com/office/drawing/2014/main" xmlns="" id="{18D2E7C0-602F-D644-BE76-5AD87004495C}"/>
               </a:ext>
             </a:extLst>
           </p:cNvPr>
@@ -10470,7 +10470,7 @@
           <p:cNvPr id="109" name="Rounded Rectangle 108">
             <a:extLst>
               <a:ext uri="{FF2B5EF4-FFF2-40B4-BE49-F238E27FC236}">
-                <a16:creationId xmlns="" xmlns:a16="http://schemas.microsoft.com/office/drawing/2014/main" id="{4B7B3C4E-A531-344F-8071-988166080BC9}"/>
+                <a16:creationId xmlns:a16="http://schemas.microsoft.com/office/drawing/2014/main" xmlns="" id="{4B7B3C4E-A531-344F-8071-988166080BC9}"/>
               </a:ext>
             </a:extLst>
           </p:cNvPr>
@@ -10554,7 +10554,7 @@
           <p:cNvPr id="110" name="Picture 109">
             <a:extLst>
               <a:ext uri="{FF2B5EF4-FFF2-40B4-BE49-F238E27FC236}">
-                <a16:creationId xmlns="" xmlns:a16="http://schemas.microsoft.com/office/drawing/2014/main" id="{D3436B46-A935-CB45-87ED-5240694C8454}"/>
+                <a16:creationId xmlns:a16="http://schemas.microsoft.com/office/drawing/2014/main" xmlns="" id="{D3436B46-A935-CB45-87ED-5240694C8454}"/>
               </a:ext>
             </a:extLst>
           </p:cNvPr>
@@ -10590,7 +10590,7 @@
           <p:cNvPr id="111" name="Rounded Rectangle 110">
             <a:extLst>
               <a:ext uri="{FF2B5EF4-FFF2-40B4-BE49-F238E27FC236}">
-                <a16:creationId xmlns="" xmlns:a16="http://schemas.microsoft.com/office/drawing/2014/main" id="{95F3D14D-9F46-7A41-ABE3-8A82BDB80A6C}"/>
+                <a16:creationId xmlns:a16="http://schemas.microsoft.com/office/drawing/2014/main" xmlns="" id="{95F3D14D-9F46-7A41-ABE3-8A82BDB80A6C}"/>
               </a:ext>
             </a:extLst>
           </p:cNvPr>
@@ -10851,7 +10851,7 @@
           <p:cNvPr id="112" name="Rounded Rectangle 111">
             <a:extLst>
               <a:ext uri="{FF2B5EF4-FFF2-40B4-BE49-F238E27FC236}">
-                <a16:creationId xmlns="" xmlns:a16="http://schemas.microsoft.com/office/drawing/2014/main" id="{58F61A96-8B69-1C4D-B6A8-2472AC93EE91}"/>
+                <a16:creationId xmlns:a16="http://schemas.microsoft.com/office/drawing/2014/main" xmlns="" id="{58F61A96-8B69-1C4D-B6A8-2472AC93EE91}"/>
               </a:ext>
             </a:extLst>
           </p:cNvPr>
@@ -10933,7 +10933,7 @@
           <p:cNvPr id="113" name="Group 112">
             <a:extLst>
               <a:ext uri="{FF2B5EF4-FFF2-40B4-BE49-F238E27FC236}">
-                <a16:creationId xmlns="" xmlns:a16="http://schemas.microsoft.com/office/drawing/2014/main" id="{77142C24-5D87-0B40-BF8D-EBB84104CC3F}"/>
+                <a16:creationId xmlns:a16="http://schemas.microsoft.com/office/drawing/2014/main" xmlns="" id="{77142C24-5D87-0B40-BF8D-EBB84104CC3F}"/>
               </a:ext>
             </a:extLst>
           </p:cNvPr>
@@ -10953,7 +10953,7 @@
             <p:cNvPr id="114" name="Picture 113">
               <a:extLst>
                 <a:ext uri="{FF2B5EF4-FFF2-40B4-BE49-F238E27FC236}">
-                  <a16:creationId xmlns="" xmlns:a16="http://schemas.microsoft.com/office/drawing/2014/main" id="{32E4AC22-06B3-A545-9D10-372457BB573A}"/>
+                  <a16:creationId xmlns:a16="http://schemas.microsoft.com/office/drawing/2014/main" xmlns="" id="{32E4AC22-06B3-A545-9D10-372457BB573A}"/>
                 </a:ext>
               </a:extLst>
             </p:cNvPr>
@@ -10996,7 +10996,7 @@
             <p:cNvPr id="115" name="Picture 114">
               <a:extLst>
                 <a:ext uri="{FF2B5EF4-FFF2-40B4-BE49-F238E27FC236}">
-                  <a16:creationId xmlns="" xmlns:a16="http://schemas.microsoft.com/office/drawing/2014/main" id="{875D89A6-4766-0045-B8BB-4B029D8381AC}"/>
+                  <a16:creationId xmlns:a16="http://schemas.microsoft.com/office/drawing/2014/main" xmlns="" id="{875D89A6-4766-0045-B8BB-4B029D8381AC}"/>
                 </a:ext>
               </a:extLst>
             </p:cNvPr>
@@ -11033,7 +11033,7 @@
           <p:cNvPr id="116" name="Group 115">
             <a:extLst>
               <a:ext uri="{FF2B5EF4-FFF2-40B4-BE49-F238E27FC236}">
-                <a16:creationId xmlns="" xmlns:a16="http://schemas.microsoft.com/office/drawing/2014/main" id="{9E4A3087-982E-5D4F-A335-B035C925B29C}"/>
+                <a16:creationId xmlns:a16="http://schemas.microsoft.com/office/drawing/2014/main" xmlns="" id="{9E4A3087-982E-5D4F-A335-B035C925B29C}"/>
               </a:ext>
             </a:extLst>
           </p:cNvPr>
@@ -11053,7 +11053,7 @@
             <p:cNvPr id="117" name="Picture 116">
               <a:extLst>
                 <a:ext uri="{FF2B5EF4-FFF2-40B4-BE49-F238E27FC236}">
-                  <a16:creationId xmlns="" xmlns:a16="http://schemas.microsoft.com/office/drawing/2014/main" id="{15EA6F1A-0A35-B54F-BC28-5915A895D138}"/>
+                  <a16:creationId xmlns:a16="http://schemas.microsoft.com/office/drawing/2014/main" xmlns="" id="{15EA6F1A-0A35-B54F-BC28-5915A895D138}"/>
                 </a:ext>
               </a:extLst>
             </p:cNvPr>
@@ -11096,7 +11096,7 @@
             <p:cNvPr id="118" name="Picture 117">
               <a:extLst>
                 <a:ext uri="{FF2B5EF4-FFF2-40B4-BE49-F238E27FC236}">
-                  <a16:creationId xmlns="" xmlns:a16="http://schemas.microsoft.com/office/drawing/2014/main" id="{C4A0248F-CBA6-654D-A0ED-79E4F1C9F66A}"/>
+                  <a16:creationId xmlns:a16="http://schemas.microsoft.com/office/drawing/2014/main" xmlns="" id="{C4A0248F-CBA6-654D-A0ED-79E4F1C9F66A}"/>
                 </a:ext>
               </a:extLst>
             </p:cNvPr>
@@ -11133,7 +11133,7 @@
           <p:cNvPr id="119" name="Group 118">
             <a:extLst>
               <a:ext uri="{FF2B5EF4-FFF2-40B4-BE49-F238E27FC236}">
-                <a16:creationId xmlns="" xmlns:a16="http://schemas.microsoft.com/office/drawing/2014/main" id="{933413C6-2CE5-BA48-8FFE-1A53AF8B6A03}"/>
+                <a16:creationId xmlns:a16="http://schemas.microsoft.com/office/drawing/2014/main" xmlns="" id="{933413C6-2CE5-BA48-8FFE-1A53AF8B6A03}"/>
               </a:ext>
             </a:extLst>
           </p:cNvPr>
@@ -11153,7 +11153,7 @@
             <p:cNvPr id="120" name="Picture 119">
               <a:extLst>
                 <a:ext uri="{FF2B5EF4-FFF2-40B4-BE49-F238E27FC236}">
-                  <a16:creationId xmlns="" xmlns:a16="http://schemas.microsoft.com/office/drawing/2014/main" id="{6C00C220-6AA1-5841-8522-8076E14816B5}"/>
+                  <a16:creationId xmlns:a16="http://schemas.microsoft.com/office/drawing/2014/main" xmlns="" id="{6C00C220-6AA1-5841-8522-8076E14816B5}"/>
                 </a:ext>
               </a:extLst>
             </p:cNvPr>
@@ -11196,7 +11196,7 @@
             <p:cNvPr id="121" name="Picture 120">
               <a:extLst>
                 <a:ext uri="{FF2B5EF4-FFF2-40B4-BE49-F238E27FC236}">
-                  <a16:creationId xmlns="" xmlns:a16="http://schemas.microsoft.com/office/drawing/2014/main" id="{DAE69181-17B7-B345-9ED3-3CF3DEB5DA2D}"/>
+                  <a16:creationId xmlns:a16="http://schemas.microsoft.com/office/drawing/2014/main" xmlns="" id="{DAE69181-17B7-B345-9ED3-3CF3DEB5DA2D}"/>
                 </a:ext>
               </a:extLst>
             </p:cNvPr>
@@ -11233,7 +11233,7 @@
           <p:cNvPr id="122" name="Group 121">
             <a:extLst>
               <a:ext uri="{FF2B5EF4-FFF2-40B4-BE49-F238E27FC236}">
-                <a16:creationId xmlns="" xmlns:a16="http://schemas.microsoft.com/office/drawing/2014/main" id="{3EABABFF-AA2E-B049-9344-A0990317A37F}"/>
+                <a16:creationId xmlns:a16="http://schemas.microsoft.com/office/drawing/2014/main" xmlns="" id="{3EABABFF-AA2E-B049-9344-A0990317A37F}"/>
               </a:ext>
             </a:extLst>
           </p:cNvPr>
@@ -11253,7 +11253,7 @@
             <p:cNvPr id="123" name="Picture 122">
               <a:extLst>
                 <a:ext uri="{FF2B5EF4-FFF2-40B4-BE49-F238E27FC236}">
-                  <a16:creationId xmlns="" xmlns:a16="http://schemas.microsoft.com/office/drawing/2014/main" id="{820AA0B3-6BC7-5D45-BA69-C516DFF5928E}"/>
+                  <a16:creationId xmlns:a16="http://schemas.microsoft.com/office/drawing/2014/main" xmlns="" id="{820AA0B3-6BC7-5D45-BA69-C516DFF5928E}"/>
                 </a:ext>
               </a:extLst>
             </p:cNvPr>
@@ -11296,7 +11296,7 @@
             <p:cNvPr id="124" name="Picture 123">
               <a:extLst>
                 <a:ext uri="{FF2B5EF4-FFF2-40B4-BE49-F238E27FC236}">
-                  <a16:creationId xmlns="" xmlns:a16="http://schemas.microsoft.com/office/drawing/2014/main" id="{E0A8E789-0A84-7C41-9A3C-81FC919F7875}"/>
+                  <a16:creationId xmlns:a16="http://schemas.microsoft.com/office/drawing/2014/main" xmlns="" id="{E0A8E789-0A84-7C41-9A3C-81FC919F7875}"/>
                 </a:ext>
               </a:extLst>
             </p:cNvPr>
@@ -11333,7 +11333,7 @@
           <p:cNvPr id="125" name="Group 124">
             <a:extLst>
               <a:ext uri="{FF2B5EF4-FFF2-40B4-BE49-F238E27FC236}">
-                <a16:creationId xmlns="" xmlns:a16="http://schemas.microsoft.com/office/drawing/2014/main" id="{B5781DCD-8A1D-CF46-8967-ED7B5AA8FF0F}"/>
+                <a16:creationId xmlns:a16="http://schemas.microsoft.com/office/drawing/2014/main" xmlns="" id="{B5781DCD-8A1D-CF46-8967-ED7B5AA8FF0F}"/>
               </a:ext>
             </a:extLst>
           </p:cNvPr>
@@ -11353,7 +11353,7 @@
             <p:cNvPr id="126" name="Picture 125">
               <a:extLst>
                 <a:ext uri="{FF2B5EF4-FFF2-40B4-BE49-F238E27FC236}">
-                  <a16:creationId xmlns="" xmlns:a16="http://schemas.microsoft.com/office/drawing/2014/main" id="{73CC257F-E917-974B-9DFB-BB51D0C71019}"/>
+                  <a16:creationId xmlns:a16="http://schemas.microsoft.com/office/drawing/2014/main" xmlns="" id="{73CC257F-E917-974B-9DFB-BB51D0C71019}"/>
                 </a:ext>
               </a:extLst>
             </p:cNvPr>
@@ -11396,7 +11396,7 @@
             <p:cNvPr id="127" name="Picture 126">
               <a:extLst>
                 <a:ext uri="{FF2B5EF4-FFF2-40B4-BE49-F238E27FC236}">
-                  <a16:creationId xmlns="" xmlns:a16="http://schemas.microsoft.com/office/drawing/2014/main" id="{27ADF93B-75AA-D648-9E1A-11159A6BA70F}"/>
+                  <a16:creationId xmlns:a16="http://schemas.microsoft.com/office/drawing/2014/main" xmlns="" id="{27ADF93B-75AA-D648-9E1A-11159A6BA70F}"/>
                 </a:ext>
               </a:extLst>
             </p:cNvPr>
@@ -11433,7 +11433,7 @@
           <p:cNvPr id="128" name="Group 127">
             <a:extLst>
               <a:ext uri="{FF2B5EF4-FFF2-40B4-BE49-F238E27FC236}">
-                <a16:creationId xmlns="" xmlns:a16="http://schemas.microsoft.com/office/drawing/2014/main" id="{20599E41-236C-4F4E-BBE8-23C9F8364679}"/>
+                <a16:creationId xmlns:a16="http://schemas.microsoft.com/office/drawing/2014/main" xmlns="" id="{20599E41-236C-4F4E-BBE8-23C9F8364679}"/>
               </a:ext>
             </a:extLst>
           </p:cNvPr>
@@ -11453,7 +11453,7 @@
             <p:cNvPr id="129" name="Picture 128">
               <a:extLst>
                 <a:ext uri="{FF2B5EF4-FFF2-40B4-BE49-F238E27FC236}">
-                  <a16:creationId xmlns="" xmlns:a16="http://schemas.microsoft.com/office/drawing/2014/main" id="{C1A49675-44CC-F743-91E9-5F7E762E0B23}"/>
+                  <a16:creationId xmlns:a16="http://schemas.microsoft.com/office/drawing/2014/main" xmlns="" id="{C1A49675-44CC-F743-91E9-5F7E762E0B23}"/>
                 </a:ext>
               </a:extLst>
             </p:cNvPr>
@@ -11496,7 +11496,7 @@
             <p:cNvPr id="133" name="Picture 132">
               <a:extLst>
                 <a:ext uri="{FF2B5EF4-FFF2-40B4-BE49-F238E27FC236}">
-                  <a16:creationId xmlns="" xmlns:a16="http://schemas.microsoft.com/office/drawing/2014/main" id="{91ECA565-503B-FF49-9BE4-83784E803173}"/>
+                  <a16:creationId xmlns:a16="http://schemas.microsoft.com/office/drawing/2014/main" xmlns="" id="{91ECA565-503B-FF49-9BE4-83784E803173}"/>
                 </a:ext>
               </a:extLst>
             </p:cNvPr>
@@ -11533,7 +11533,7 @@
           <p:cNvPr id="135" name="Rounded Rectangle 134">
             <a:extLst>
               <a:ext uri="{FF2B5EF4-FFF2-40B4-BE49-F238E27FC236}">
-                <a16:creationId xmlns="" xmlns:a16="http://schemas.microsoft.com/office/drawing/2014/main" id="{16D80F87-C85C-E749-B7D1-E9D523AC3EE9}"/>
+                <a16:creationId xmlns:a16="http://schemas.microsoft.com/office/drawing/2014/main" xmlns="" id="{16D80F87-C85C-E749-B7D1-E9D523AC3EE9}"/>
               </a:ext>
             </a:extLst>
           </p:cNvPr>
@@ -11623,7 +11623,7 @@
           <p:cNvPr id="137" name="Rounded Rectangle 136">
             <a:extLst>
               <a:ext uri="{FF2B5EF4-FFF2-40B4-BE49-F238E27FC236}">
-                <a16:creationId xmlns="" xmlns:a16="http://schemas.microsoft.com/office/drawing/2014/main" id="{804CF3A3-388B-5049-99B5-BD0318407DCB}"/>
+                <a16:creationId xmlns:a16="http://schemas.microsoft.com/office/drawing/2014/main" xmlns="" id="{804CF3A3-388B-5049-99B5-BD0318407DCB}"/>
               </a:ext>
             </a:extLst>
           </p:cNvPr>
@@ -11707,7 +11707,7 @@
           <p:cNvPr id="138" name="Rounded Rectangle 137">
             <a:extLst>
               <a:ext uri="{FF2B5EF4-FFF2-40B4-BE49-F238E27FC236}">
-                <a16:creationId xmlns="" xmlns:a16="http://schemas.microsoft.com/office/drawing/2014/main" id="{7F4C19CA-9E49-EF41-811F-AB350E512E40}"/>
+                <a16:creationId xmlns:a16="http://schemas.microsoft.com/office/drawing/2014/main" xmlns="" id="{7F4C19CA-9E49-EF41-811F-AB350E512E40}"/>
               </a:ext>
             </a:extLst>
           </p:cNvPr>
@@ -11772,7 +11772,7 @@
           <p:cNvPr id="139" name="Rounded Rectangle 138">
             <a:extLst>
               <a:ext uri="{FF2B5EF4-FFF2-40B4-BE49-F238E27FC236}">
-                <a16:creationId xmlns="" xmlns:a16="http://schemas.microsoft.com/office/drawing/2014/main" id="{3CE4B3CF-1519-A949-8083-8DD3ED7F09F3}"/>
+                <a16:creationId xmlns:a16="http://schemas.microsoft.com/office/drawing/2014/main" xmlns="" id="{3CE4B3CF-1519-A949-8083-8DD3ED7F09F3}"/>
               </a:ext>
             </a:extLst>
           </p:cNvPr>
@@ -11846,7 +11846,7 @@
           <p:cNvPr id="140" name="Straight Connector 139">
             <a:extLst>
               <a:ext uri="{FF2B5EF4-FFF2-40B4-BE49-F238E27FC236}">
-                <a16:creationId xmlns="" xmlns:a16="http://schemas.microsoft.com/office/drawing/2014/main" id="{83D9A465-7F9A-D647-BB8D-95E7D93324C7}"/>
+                <a16:creationId xmlns:a16="http://schemas.microsoft.com/office/drawing/2014/main" xmlns="" id="{83D9A465-7F9A-D647-BB8D-95E7D93324C7}"/>
               </a:ext>
             </a:extLst>
           </p:cNvPr>
@@ -11890,7 +11890,7 @@
           <p:cNvPr id="142" name="Straight Connector 141">
             <a:extLst>
               <a:ext uri="{FF2B5EF4-FFF2-40B4-BE49-F238E27FC236}">
-                <a16:creationId xmlns="" xmlns:a16="http://schemas.microsoft.com/office/drawing/2014/main" id="{6F5E5DB1-CE8B-A743-812A-CD1FB067D597}"/>
+                <a16:creationId xmlns:a16="http://schemas.microsoft.com/office/drawing/2014/main" xmlns="" id="{6F5E5DB1-CE8B-A743-812A-CD1FB067D597}"/>
               </a:ext>
             </a:extLst>
           </p:cNvPr>
@@ -11945,7 +11945,7 @@
           <p:cNvPr id="143" name="Straight Connector 142">
             <a:extLst>
               <a:ext uri="{FF2B5EF4-FFF2-40B4-BE49-F238E27FC236}">
-                <a16:creationId xmlns="" xmlns:a16="http://schemas.microsoft.com/office/drawing/2014/main" id="{207454CF-6B05-EF42-B246-84D394D78949}"/>
+                <a16:creationId xmlns:a16="http://schemas.microsoft.com/office/drawing/2014/main" xmlns="" id="{207454CF-6B05-EF42-B246-84D394D78949}"/>
               </a:ext>
             </a:extLst>
           </p:cNvPr>
@@ -11989,7 +11989,7 @@
           <p:cNvPr id="144" name="Straight Connector 143">
             <a:extLst>
               <a:ext uri="{FF2B5EF4-FFF2-40B4-BE49-F238E27FC236}">
-                <a16:creationId xmlns="" xmlns:a16="http://schemas.microsoft.com/office/drawing/2014/main" id="{1C605778-F077-1B46-9AD6-7D0A17BBB927}"/>
+                <a16:creationId xmlns:a16="http://schemas.microsoft.com/office/drawing/2014/main" xmlns="" id="{1C605778-F077-1B46-9AD6-7D0A17BBB927}"/>
               </a:ext>
             </a:extLst>
           </p:cNvPr>
@@ -12033,7 +12033,7 @@
           <p:cNvPr id="145" name="Rounded Rectangle 144">
             <a:extLst>
               <a:ext uri="{FF2B5EF4-FFF2-40B4-BE49-F238E27FC236}">
-                <a16:creationId xmlns="" xmlns:a16="http://schemas.microsoft.com/office/drawing/2014/main" id="{59822B67-70F0-5E4E-93C4-F658B5D6D252}"/>
+                <a16:creationId xmlns:a16="http://schemas.microsoft.com/office/drawing/2014/main" xmlns="" id="{59822B67-70F0-5E4E-93C4-F658B5D6D252}"/>
               </a:ext>
             </a:extLst>
           </p:cNvPr>
@@ -12102,7 +12102,7 @@
           <p:cNvPr id="147" name="Straight Connector 146">
             <a:extLst>
               <a:ext uri="{FF2B5EF4-FFF2-40B4-BE49-F238E27FC236}">
-                <a16:creationId xmlns="" xmlns:a16="http://schemas.microsoft.com/office/drawing/2014/main" id="{6F5A09EE-4E9D-2D40-8839-EA4BC8B32AD6}"/>
+                <a16:creationId xmlns:a16="http://schemas.microsoft.com/office/drawing/2014/main" xmlns="" id="{6F5A09EE-4E9D-2D40-8839-EA4BC8B32AD6}"/>
               </a:ext>
             </a:extLst>
           </p:cNvPr>
@@ -12146,7 +12146,7 @@
           <p:cNvPr id="148" name="Rounded Rectangle 147">
             <a:extLst>
               <a:ext uri="{FF2B5EF4-FFF2-40B4-BE49-F238E27FC236}">
-                <a16:creationId xmlns="" xmlns:a16="http://schemas.microsoft.com/office/drawing/2014/main" id="{30B3DB3A-B9BC-4A43-BDD0-16B109726168}"/>
+                <a16:creationId xmlns:a16="http://schemas.microsoft.com/office/drawing/2014/main" xmlns="" id="{30B3DB3A-B9BC-4A43-BDD0-16B109726168}"/>
               </a:ext>
             </a:extLst>
           </p:cNvPr>
@@ -12213,7 +12213,7 @@
           <p:cNvPr id="149" name="Rounded Rectangle 148">
             <a:extLst>
               <a:ext uri="{FF2B5EF4-FFF2-40B4-BE49-F238E27FC236}">
-                <a16:creationId xmlns="" xmlns:a16="http://schemas.microsoft.com/office/drawing/2014/main" id="{E3876AA5-D2F0-3C4D-9850-9162AAE35B00}"/>
+                <a16:creationId xmlns:a16="http://schemas.microsoft.com/office/drawing/2014/main" xmlns="" id="{E3876AA5-D2F0-3C4D-9850-9162AAE35B00}"/>
               </a:ext>
             </a:extLst>
           </p:cNvPr>
@@ -12290,7 +12290,7 @@
           <p:cNvPr id="150" name="Rounded Rectangle 149">
             <a:extLst>
               <a:ext uri="{FF2B5EF4-FFF2-40B4-BE49-F238E27FC236}">
-                <a16:creationId xmlns="" xmlns:a16="http://schemas.microsoft.com/office/drawing/2014/main" id="{A351274A-1FF6-0142-B4E6-46962E82AFDB}"/>
+                <a16:creationId xmlns:a16="http://schemas.microsoft.com/office/drawing/2014/main" xmlns="" id="{A351274A-1FF6-0142-B4E6-46962E82AFDB}"/>
               </a:ext>
             </a:extLst>
           </p:cNvPr>
@@ -12364,7 +12364,7 @@
           <p:cNvPr id="151" name="Rounded Rectangle 150">
             <a:extLst>
               <a:ext uri="{FF2B5EF4-FFF2-40B4-BE49-F238E27FC236}">
-                <a16:creationId xmlns="" xmlns:a16="http://schemas.microsoft.com/office/drawing/2014/main" id="{FD735D03-280A-BC46-AF9D-DB74D8731533}"/>
+                <a16:creationId xmlns:a16="http://schemas.microsoft.com/office/drawing/2014/main" xmlns="" id="{FD735D03-280A-BC46-AF9D-DB74D8731533}"/>
               </a:ext>
             </a:extLst>
           </p:cNvPr>
@@ -12429,7 +12429,7 @@
           <p:cNvPr id="152" name="Rounded Rectangle 151">
             <a:extLst>
               <a:ext uri="{FF2B5EF4-FFF2-40B4-BE49-F238E27FC236}">
-                <a16:creationId xmlns="" xmlns:a16="http://schemas.microsoft.com/office/drawing/2014/main" id="{477342D7-6A05-E043-B17C-D0836B86CB21}"/>
+                <a16:creationId xmlns:a16="http://schemas.microsoft.com/office/drawing/2014/main" xmlns="" id="{477342D7-6A05-E043-B17C-D0836B86CB21}"/>
               </a:ext>
             </a:extLst>
           </p:cNvPr>
@@ -12494,7 +12494,7 @@
           <p:cNvPr id="153" name="Rounded Rectangle 152">
             <a:extLst>
               <a:ext uri="{FF2B5EF4-FFF2-40B4-BE49-F238E27FC236}">
-                <a16:creationId xmlns="" xmlns:a16="http://schemas.microsoft.com/office/drawing/2014/main" id="{8581AB5D-4FFE-2448-9666-CCC8276A4618}"/>
+                <a16:creationId xmlns:a16="http://schemas.microsoft.com/office/drawing/2014/main" xmlns="" id="{8581AB5D-4FFE-2448-9666-CCC8276A4618}"/>
               </a:ext>
             </a:extLst>
           </p:cNvPr>
@@ -12559,7 +12559,7 @@
           <p:cNvPr id="154" name="Rounded Rectangle 153">
             <a:extLst>
               <a:ext uri="{FF2B5EF4-FFF2-40B4-BE49-F238E27FC236}">
-                <a16:creationId xmlns="" xmlns:a16="http://schemas.microsoft.com/office/drawing/2014/main" id="{DE42D0F5-AD68-BB4D-A02B-0E83F442CE14}"/>
+                <a16:creationId xmlns:a16="http://schemas.microsoft.com/office/drawing/2014/main" xmlns="" id="{DE42D0F5-AD68-BB4D-A02B-0E83F442CE14}"/>
               </a:ext>
             </a:extLst>
           </p:cNvPr>
@@ -12624,7 +12624,7 @@
           <p:cNvPr id="155" name="Rounded Rectangle 154">
             <a:extLst>
               <a:ext uri="{FF2B5EF4-FFF2-40B4-BE49-F238E27FC236}">
-                <a16:creationId xmlns="" xmlns:a16="http://schemas.microsoft.com/office/drawing/2014/main" id="{9B536277-F17A-0648-9D79-C6E4BCD8677C}"/>
+                <a16:creationId xmlns:a16="http://schemas.microsoft.com/office/drawing/2014/main" xmlns="" id="{9B536277-F17A-0648-9D79-C6E4BCD8677C}"/>
               </a:ext>
             </a:extLst>
           </p:cNvPr>
@@ -12689,7 +12689,7 @@
           <p:cNvPr id="156" name="Rounded Rectangle 155">
             <a:extLst>
               <a:ext uri="{FF2B5EF4-FFF2-40B4-BE49-F238E27FC236}">
-                <a16:creationId xmlns="" xmlns:a16="http://schemas.microsoft.com/office/drawing/2014/main" id="{FB38770D-3B1E-2942-BB68-4B2196358FE5}"/>
+                <a16:creationId xmlns:a16="http://schemas.microsoft.com/office/drawing/2014/main" xmlns="" id="{FB38770D-3B1E-2942-BB68-4B2196358FE5}"/>
               </a:ext>
             </a:extLst>
           </p:cNvPr>
@@ -12758,7 +12758,7 @@
           <p:cNvPr id="157" name="Straight Connector 156">
             <a:extLst>
               <a:ext uri="{FF2B5EF4-FFF2-40B4-BE49-F238E27FC236}">
-                <a16:creationId xmlns="" xmlns:a16="http://schemas.microsoft.com/office/drawing/2014/main" id="{D90F438F-1E80-E641-BE3F-43431E029618}"/>
+                <a16:creationId xmlns:a16="http://schemas.microsoft.com/office/drawing/2014/main" xmlns="" id="{D90F438F-1E80-E641-BE3F-43431E029618}"/>
               </a:ext>
             </a:extLst>
           </p:cNvPr>
@@ -12802,7 +12802,7 @@
           <p:cNvPr id="158" name="Rounded Rectangle 157">
             <a:extLst>
               <a:ext uri="{FF2B5EF4-FFF2-40B4-BE49-F238E27FC236}">
-                <a16:creationId xmlns="" xmlns:a16="http://schemas.microsoft.com/office/drawing/2014/main" id="{5742A9BD-5E2B-A34C-8C6E-C8CF6CAB0138}"/>
+                <a16:creationId xmlns:a16="http://schemas.microsoft.com/office/drawing/2014/main" xmlns="" id="{5742A9BD-5E2B-A34C-8C6E-C8CF6CAB0138}"/>
               </a:ext>
             </a:extLst>
           </p:cNvPr>
@@ -12875,7 +12875,7 @@
           <p:cNvPr id="159" name="Rounded Rectangle 158">
             <a:extLst>
               <a:ext uri="{FF2B5EF4-FFF2-40B4-BE49-F238E27FC236}">
-                <a16:creationId xmlns="" xmlns:a16="http://schemas.microsoft.com/office/drawing/2014/main" id="{A1607D64-15E0-7044-A53C-BFE2E3E67748}"/>
+                <a16:creationId xmlns:a16="http://schemas.microsoft.com/office/drawing/2014/main" xmlns="" id="{A1607D64-15E0-7044-A53C-BFE2E3E67748}"/>
               </a:ext>
             </a:extLst>
           </p:cNvPr>
@@ -12940,7 +12940,7 @@
           <p:cNvPr id="160" name="Rounded Rectangle 159">
             <a:extLst>
               <a:ext uri="{FF2B5EF4-FFF2-40B4-BE49-F238E27FC236}">
-                <a16:creationId xmlns="" xmlns:a16="http://schemas.microsoft.com/office/drawing/2014/main" id="{E17EC56C-AC16-514D-914A-7C552702C47E}"/>
+                <a16:creationId xmlns:a16="http://schemas.microsoft.com/office/drawing/2014/main" xmlns="" id="{E17EC56C-AC16-514D-914A-7C552702C47E}"/>
               </a:ext>
             </a:extLst>
           </p:cNvPr>
@@ -13007,7 +13007,7 @@
           <p:cNvPr id="161" name="Rectangle 160">
             <a:extLst>
               <a:ext uri="{FF2B5EF4-FFF2-40B4-BE49-F238E27FC236}">
-                <a16:creationId xmlns="" xmlns:a16="http://schemas.microsoft.com/office/drawing/2014/main" id="{04FB3D77-0506-5F44-B52F-526D5B669669}"/>
+                <a16:creationId xmlns:a16="http://schemas.microsoft.com/office/drawing/2014/main" xmlns="" id="{04FB3D77-0506-5F44-B52F-526D5B669669}"/>
               </a:ext>
             </a:extLst>
           </p:cNvPr>
@@ -13058,7 +13058,7 @@
           <p:cNvPr id="162" name="Rectangle 161">
             <a:extLst>
               <a:ext uri="{FF2B5EF4-FFF2-40B4-BE49-F238E27FC236}">
-                <a16:creationId xmlns="" xmlns:a16="http://schemas.microsoft.com/office/drawing/2014/main" id="{0551A79A-857A-2341-8DDA-27E8E8DD0FBA}"/>
+                <a16:creationId xmlns:a16="http://schemas.microsoft.com/office/drawing/2014/main" xmlns="" id="{0551A79A-857A-2341-8DDA-27E8E8DD0FBA}"/>
               </a:ext>
             </a:extLst>
           </p:cNvPr>
@@ -13104,113 +13104,12 @@
           </a:p>
         </p:txBody>
       </p:sp>
-      <p:sp>
-        <p:nvSpPr>
-          <p:cNvPr id="163" name="Rectangle 162">
-            <a:extLst>
-              <a:ext uri="{FF2B5EF4-FFF2-40B4-BE49-F238E27FC236}">
-                <a16:creationId xmlns="" xmlns:a16="http://schemas.microsoft.com/office/drawing/2014/main" id="{52E6BDC1-601C-6443-BE7E-E4B387B3CB5F}"/>
-              </a:ext>
-            </a:extLst>
-          </p:cNvPr>
-          <p:cNvSpPr/>
-          <p:nvPr/>
-        </p:nvSpPr>
-        <p:spPr>
-          <a:xfrm>
-            <a:off x="10192481" y="5542495"/>
-            <a:ext cx="943910" cy="213954"/>
-          </a:xfrm>
-          <a:prstGeom prst="rect">
-            <a:avLst/>
-          </a:prstGeom>
-          <a:noFill/>
-          <a:effectLst/>
-        </p:spPr>
-        <p:txBody>
-          <a:bodyPr wrap="square" lIns="0" rIns="0">
-            <a:noAutofit/>
-          </a:bodyPr>
-          <a:lstStyle/>
-          <a:p>
-            <a:pPr algn="r">
-              <a:lnSpc>
-                <a:spcPts val="1300"/>
-              </a:lnSpc>
-            </a:pPr>
-            <a:r>
-              <a:rPr lang="en-US" sz="1100" b="1" dirty="0">
-                <a:ln w="0"/>
-                <a:solidFill>
-                  <a:schemeClr val="tx1">
-                    <a:lumMod val="60000"/>
-                    <a:lumOff val="40000"/>
-                  </a:schemeClr>
-                </a:solidFill>
-                <a:latin typeface="Source Sans Pro" charset="0"/>
-                <a:ea typeface="Source Sans Pro" charset="0"/>
-                <a:cs typeface="Source Sans Pro" charset="0"/>
-              </a:rPr>
-              <a:t>PLATFORM</a:t>
-            </a:r>
-          </a:p>
-        </p:txBody>
-      </p:sp>
-      <p:sp>
-        <p:nvSpPr>
-          <p:cNvPr id="164" name="Rectangle 163">
-            <a:extLst>
-              <a:ext uri="{FF2B5EF4-FFF2-40B4-BE49-F238E27FC236}">
-                <a16:creationId xmlns="" xmlns:a16="http://schemas.microsoft.com/office/drawing/2014/main" id="{BCCE5A28-9314-0B4D-97B3-919FF26B310B}"/>
-              </a:ext>
-            </a:extLst>
-          </p:cNvPr>
-          <p:cNvSpPr/>
-          <p:nvPr/>
-        </p:nvSpPr>
-        <p:spPr>
-          <a:xfrm>
-            <a:off x="9712130" y="3798913"/>
-            <a:ext cx="1424261" cy="213954"/>
-          </a:xfrm>
-          <a:prstGeom prst="rect">
-            <a:avLst/>
-          </a:prstGeom>
-          <a:noFill/>
-          <a:effectLst/>
-        </p:spPr>
-        <p:txBody>
-          <a:bodyPr wrap="square" lIns="0" rIns="0">
-            <a:noAutofit/>
-          </a:bodyPr>
-          <a:lstStyle/>
-          <a:p>
-            <a:pPr algn="r">
-              <a:lnSpc>
-                <a:spcPts val="1300"/>
-              </a:lnSpc>
-            </a:pPr>
-            <a:r>
-              <a:rPr lang="en-US" sz="1100" b="1" dirty="0">
-                <a:ln w="0"/>
-                <a:solidFill>
-                  <a:schemeClr val="accent1"/>
-                </a:solidFill>
-                <a:latin typeface="Source Sans Pro" charset="0"/>
-                <a:ea typeface="Source Sans Pro" charset="0"/>
-                <a:cs typeface="Source Sans Pro" charset="0"/>
-              </a:rPr>
-              <a:t>VIRTUALIZATION</a:t>
-            </a:r>
-          </a:p>
-        </p:txBody>
-      </p:sp>
       <p:grpSp>
         <p:nvGrpSpPr>
           <p:cNvPr id="165" name="Group 164">
             <a:extLst>
               <a:ext uri="{FF2B5EF4-FFF2-40B4-BE49-F238E27FC236}">
-                <a16:creationId xmlns="" xmlns:a16="http://schemas.microsoft.com/office/drawing/2014/main" id="{B2093A1D-7C23-C14A-BA2D-CDD5BABDCA07}"/>
+                <a16:creationId xmlns:a16="http://schemas.microsoft.com/office/drawing/2014/main" xmlns="" id="{B2093A1D-7C23-C14A-BA2D-CDD5BABDCA07}"/>
               </a:ext>
             </a:extLst>
           </p:cNvPr>
@@ -13230,7 +13129,7 @@
             <p:cNvPr id="166" name="Rounded Rectangle 165">
               <a:extLst>
                 <a:ext uri="{FF2B5EF4-FFF2-40B4-BE49-F238E27FC236}">
-                  <a16:creationId xmlns="" xmlns:a16="http://schemas.microsoft.com/office/drawing/2014/main" id="{47515010-D167-C04A-AE31-C0E579A6C21A}"/>
+                  <a16:creationId xmlns:a16="http://schemas.microsoft.com/office/drawing/2014/main" xmlns="" id="{47515010-D167-C04A-AE31-C0E579A6C21A}"/>
                 </a:ext>
               </a:extLst>
             </p:cNvPr>
@@ -13284,7 +13183,7 @@
             <p:cNvPr id="167" name="Group 166">
               <a:extLst>
                 <a:ext uri="{FF2B5EF4-FFF2-40B4-BE49-F238E27FC236}">
-                  <a16:creationId xmlns="" xmlns:a16="http://schemas.microsoft.com/office/drawing/2014/main" id="{8875227B-C89E-BB4B-9A52-33FBFD691964}"/>
+                  <a16:creationId xmlns:a16="http://schemas.microsoft.com/office/drawing/2014/main" xmlns="" id="{8875227B-C89E-BB4B-9A52-33FBFD691964}"/>
                 </a:ext>
               </a:extLst>
             </p:cNvPr>
@@ -13304,7 +13203,7 @@
               <p:cNvPr id="168" name="Group 167">
                 <a:extLst>
                   <a:ext uri="{FF2B5EF4-FFF2-40B4-BE49-F238E27FC236}">
-                    <a16:creationId xmlns="" xmlns:a16="http://schemas.microsoft.com/office/drawing/2014/main" id="{7047DF6E-7500-0A49-A641-456FBD08492E}"/>
+                    <a16:creationId xmlns:a16="http://schemas.microsoft.com/office/drawing/2014/main" xmlns="" id="{7047DF6E-7500-0A49-A641-456FBD08492E}"/>
                   </a:ext>
                 </a:extLst>
               </p:cNvPr>
@@ -13324,7 +13223,7 @@
                 <p:cNvPr id="173" name="Picture 172">
                   <a:extLst>
                     <a:ext uri="{FF2B5EF4-FFF2-40B4-BE49-F238E27FC236}">
-                      <a16:creationId xmlns="" xmlns:a16="http://schemas.microsoft.com/office/drawing/2014/main" id="{E95E9309-044E-DB41-805C-FEE86D8E28AB}"/>
+                      <a16:creationId xmlns:a16="http://schemas.microsoft.com/office/drawing/2014/main" xmlns="" id="{E95E9309-044E-DB41-805C-FEE86D8E28AB}"/>
                     </a:ext>
                   </a:extLst>
                 </p:cNvPr>
@@ -13360,7 +13259,7 @@
                 <p:cNvPr id="174" name="Rectangle 173">
                   <a:extLst>
                     <a:ext uri="{FF2B5EF4-FFF2-40B4-BE49-F238E27FC236}">
-                      <a16:creationId xmlns="" xmlns:a16="http://schemas.microsoft.com/office/drawing/2014/main" id="{81974314-48B7-274D-A275-BAAF9058BEBB}"/>
+                      <a16:creationId xmlns:a16="http://schemas.microsoft.com/office/drawing/2014/main" xmlns="" id="{81974314-48B7-274D-A275-BAAF9058BEBB}"/>
                     </a:ext>
                   </a:extLst>
                 </p:cNvPr>
@@ -13427,7 +13326,7 @@
                 <p:cNvPr id="175" name="Elbow Connector 174">
                   <a:extLst>
                     <a:ext uri="{FF2B5EF4-FFF2-40B4-BE49-F238E27FC236}">
-                      <a16:creationId xmlns="" xmlns:a16="http://schemas.microsoft.com/office/drawing/2014/main" id="{64C460AB-2371-5741-A52C-1DD7FC51EFDF}"/>
+                      <a16:creationId xmlns:a16="http://schemas.microsoft.com/office/drawing/2014/main" xmlns="" id="{64C460AB-2371-5741-A52C-1DD7FC51EFDF}"/>
                     </a:ext>
                   </a:extLst>
                 </p:cNvPr>
@@ -13464,7 +13363,7 @@
                 <p:cNvPr id="176" name="Elbow Connector 175">
                   <a:extLst>
                     <a:ext uri="{FF2B5EF4-FFF2-40B4-BE49-F238E27FC236}">
-                      <a16:creationId xmlns="" xmlns:a16="http://schemas.microsoft.com/office/drawing/2014/main" id="{116FC827-7AC9-D54F-B2AE-71B1D0D4356C}"/>
+                      <a16:creationId xmlns:a16="http://schemas.microsoft.com/office/drawing/2014/main" xmlns="" id="{116FC827-7AC9-D54F-B2AE-71B1D0D4356C}"/>
                     </a:ext>
                   </a:extLst>
                 </p:cNvPr>
@@ -13505,7 +13404,7 @@
                 <p:cNvPr id="177" name="Elbow Connector 176">
                   <a:extLst>
                     <a:ext uri="{FF2B5EF4-FFF2-40B4-BE49-F238E27FC236}">
-                      <a16:creationId xmlns="" xmlns:a16="http://schemas.microsoft.com/office/drawing/2014/main" id="{BC64A19C-7046-AE4A-8E12-B9875D33E7CF}"/>
+                      <a16:creationId xmlns:a16="http://schemas.microsoft.com/office/drawing/2014/main" xmlns="" id="{BC64A19C-7046-AE4A-8E12-B9875D33E7CF}"/>
                     </a:ext>
                   </a:extLst>
                 </p:cNvPr>
@@ -13546,7 +13445,7 @@
                 <p:cNvPr id="178" name="Elbow Connector 177">
                   <a:extLst>
                     <a:ext uri="{FF2B5EF4-FFF2-40B4-BE49-F238E27FC236}">
-                      <a16:creationId xmlns="" xmlns:a16="http://schemas.microsoft.com/office/drawing/2014/main" id="{DC170DBD-E02E-0645-A581-6F546B607A6A}"/>
+                      <a16:creationId xmlns:a16="http://schemas.microsoft.com/office/drawing/2014/main" xmlns="" id="{DC170DBD-E02E-0645-A581-6F546B607A6A}"/>
                     </a:ext>
                   </a:extLst>
                 </p:cNvPr>
@@ -13587,7 +13486,7 @@
                 <p:cNvPr id="179" name="Elbow Connector 178">
                   <a:extLst>
                     <a:ext uri="{FF2B5EF4-FFF2-40B4-BE49-F238E27FC236}">
-                      <a16:creationId xmlns="" xmlns:a16="http://schemas.microsoft.com/office/drawing/2014/main" id="{9D0F1040-C941-2B4B-905A-8231550421F1}"/>
+                      <a16:creationId xmlns:a16="http://schemas.microsoft.com/office/drawing/2014/main" xmlns="" id="{9D0F1040-C941-2B4B-905A-8231550421F1}"/>
                     </a:ext>
                   </a:extLst>
                 </p:cNvPr>
@@ -13628,7 +13527,7 @@
                 <p:cNvPr id="180" name="Arrow: Down 81">
                   <a:extLst>
                     <a:ext uri="{FF2B5EF4-FFF2-40B4-BE49-F238E27FC236}">
-                      <a16:creationId xmlns="" xmlns:a16="http://schemas.microsoft.com/office/drawing/2014/main" id="{DF9C8DE6-C236-EE48-8077-3A2AC4C3E469}"/>
+                      <a16:creationId xmlns:a16="http://schemas.microsoft.com/office/drawing/2014/main" xmlns="" id="{DF9C8DE6-C236-EE48-8077-3A2AC4C3E469}"/>
                     </a:ext>
                   </a:extLst>
                 </p:cNvPr>
@@ -13683,7 +13582,7 @@
                 <p:cNvPr id="181" name="Picture 180">
                   <a:extLst>
                     <a:ext uri="{FF2B5EF4-FFF2-40B4-BE49-F238E27FC236}">
-                      <a16:creationId xmlns="" xmlns:a16="http://schemas.microsoft.com/office/drawing/2014/main" id="{A5C64DF8-EE3B-434D-8249-3084AD7CF17B}"/>
+                      <a16:creationId xmlns:a16="http://schemas.microsoft.com/office/drawing/2014/main" xmlns="" id="{A5C64DF8-EE3B-434D-8249-3084AD7CF17B}"/>
                     </a:ext>
                   </a:extLst>
                 </p:cNvPr>
@@ -13719,7 +13618,7 @@
                 <p:cNvPr id="182" name="Picture 181">
                   <a:extLst>
                     <a:ext uri="{FF2B5EF4-FFF2-40B4-BE49-F238E27FC236}">
-                      <a16:creationId xmlns="" xmlns:a16="http://schemas.microsoft.com/office/drawing/2014/main" id="{14F81D31-38BC-A542-A148-D23E0206ABBE}"/>
+                      <a16:creationId xmlns:a16="http://schemas.microsoft.com/office/drawing/2014/main" xmlns="" id="{14F81D31-38BC-A542-A148-D23E0206ABBE}"/>
                     </a:ext>
                   </a:extLst>
                 </p:cNvPr>
@@ -13759,7 +13658,7 @@
                 <p:cNvPr id="183" name="Rectangle 182">
                   <a:extLst>
                     <a:ext uri="{FF2B5EF4-FFF2-40B4-BE49-F238E27FC236}">
-                      <a16:creationId xmlns="" xmlns:a16="http://schemas.microsoft.com/office/drawing/2014/main" id="{1F273907-D5AC-6B4E-A12C-25A5222B2E88}"/>
+                      <a16:creationId xmlns:a16="http://schemas.microsoft.com/office/drawing/2014/main" xmlns="" id="{1F273907-D5AC-6B4E-A12C-25A5222B2E88}"/>
                     </a:ext>
                   </a:extLst>
                 </p:cNvPr>
@@ -13823,7 +13722,7 @@
                 <p:cNvPr id="184" name="Group 183">
                   <a:extLst>
                     <a:ext uri="{FF2B5EF4-FFF2-40B4-BE49-F238E27FC236}">
-                      <a16:creationId xmlns="" xmlns:a16="http://schemas.microsoft.com/office/drawing/2014/main" id="{61FE2C8F-7024-8D41-9C05-6425C99F4B6D}"/>
+                      <a16:creationId xmlns:a16="http://schemas.microsoft.com/office/drawing/2014/main" xmlns="" id="{61FE2C8F-7024-8D41-9C05-6425C99F4B6D}"/>
                     </a:ext>
                   </a:extLst>
                 </p:cNvPr>
@@ -13843,7 +13742,7 @@
                   <p:cNvPr id="229" name="Elbow Connector 228">
                     <a:extLst>
                       <a:ext uri="{FF2B5EF4-FFF2-40B4-BE49-F238E27FC236}">
-                        <a16:creationId xmlns="" xmlns:a16="http://schemas.microsoft.com/office/drawing/2014/main" id="{DE76D78D-8CA0-A34B-8B36-C12C3855C063}"/>
+                        <a16:creationId xmlns:a16="http://schemas.microsoft.com/office/drawing/2014/main" xmlns="" id="{DE76D78D-8CA0-A34B-8B36-C12C3855C063}"/>
                       </a:ext>
                     </a:extLst>
                   </p:cNvPr>
@@ -13884,7 +13783,7 @@
                   <p:cNvPr id="230" name="Elbow Connector 229">
                     <a:extLst>
                       <a:ext uri="{FF2B5EF4-FFF2-40B4-BE49-F238E27FC236}">
-                        <a16:creationId xmlns="" xmlns:a16="http://schemas.microsoft.com/office/drawing/2014/main" id="{E06EDEE7-E79F-D242-AFB1-524966507DF5}"/>
+                        <a16:creationId xmlns:a16="http://schemas.microsoft.com/office/drawing/2014/main" xmlns="" id="{E06EDEE7-E79F-D242-AFB1-524966507DF5}"/>
                       </a:ext>
                     </a:extLst>
                   </p:cNvPr>
@@ -13927,7 +13826,7 @@
                   <p:cNvPr id="231" name="Elbow Connector 230">
                     <a:extLst>
                       <a:ext uri="{FF2B5EF4-FFF2-40B4-BE49-F238E27FC236}">
-                        <a16:creationId xmlns="" xmlns:a16="http://schemas.microsoft.com/office/drawing/2014/main" id="{001CD2BB-F139-4946-8633-E7129E777845}"/>
+                        <a16:creationId xmlns:a16="http://schemas.microsoft.com/office/drawing/2014/main" xmlns="" id="{001CD2BB-F139-4946-8633-E7129E777845}"/>
                       </a:ext>
                     </a:extLst>
                   </p:cNvPr>
@@ -13970,7 +13869,7 @@
                   <p:cNvPr id="232" name="Elbow Connector 231">
                     <a:extLst>
                       <a:ext uri="{FF2B5EF4-FFF2-40B4-BE49-F238E27FC236}">
-                        <a16:creationId xmlns="" xmlns:a16="http://schemas.microsoft.com/office/drawing/2014/main" id="{E9B4859D-AA41-D94B-8865-E8F4A5E9201A}"/>
+                        <a16:creationId xmlns:a16="http://schemas.microsoft.com/office/drawing/2014/main" xmlns="" id="{E9B4859D-AA41-D94B-8865-E8F4A5E9201A}"/>
                       </a:ext>
                     </a:extLst>
                   </p:cNvPr>
@@ -14013,7 +13912,7 @@
                   <p:cNvPr id="233" name="Elbow Connector 232">
                     <a:extLst>
                       <a:ext uri="{FF2B5EF4-FFF2-40B4-BE49-F238E27FC236}">
-                        <a16:creationId xmlns="" xmlns:a16="http://schemas.microsoft.com/office/drawing/2014/main" id="{EA4371AF-C510-9447-866C-FA2152F51914}"/>
+                        <a16:creationId xmlns:a16="http://schemas.microsoft.com/office/drawing/2014/main" xmlns="" id="{EA4371AF-C510-9447-866C-FA2152F51914}"/>
                       </a:ext>
                     </a:extLst>
                   </p:cNvPr>
@@ -14057,7 +13956,7 @@
                 <p:cNvPr id="185" name="Arrow: Down 81">
                   <a:extLst>
                     <a:ext uri="{FF2B5EF4-FFF2-40B4-BE49-F238E27FC236}">
-                      <a16:creationId xmlns="" xmlns:a16="http://schemas.microsoft.com/office/drawing/2014/main" id="{1BFF8924-F086-F54C-8E85-B5D3363F8E74}"/>
+                      <a16:creationId xmlns:a16="http://schemas.microsoft.com/office/drawing/2014/main" xmlns="" id="{1BFF8924-F086-F54C-8E85-B5D3363F8E74}"/>
                     </a:ext>
                   </a:extLst>
                 </p:cNvPr>
@@ -14112,7 +14011,7 @@
                 <p:cNvPr id="186" name="Rectangle 185">
                   <a:extLst>
                     <a:ext uri="{FF2B5EF4-FFF2-40B4-BE49-F238E27FC236}">
-                      <a16:creationId xmlns="" xmlns:a16="http://schemas.microsoft.com/office/drawing/2014/main" id="{C29D49CD-F70D-B941-A935-CC7532E3C211}"/>
+                      <a16:creationId xmlns:a16="http://schemas.microsoft.com/office/drawing/2014/main" xmlns="" id="{C29D49CD-F70D-B941-A935-CC7532E3C211}"/>
                     </a:ext>
                   </a:extLst>
                 </p:cNvPr>
@@ -14164,7 +14063,7 @@
                 <p:cNvPr id="187" name="Rectangle 186">
                   <a:extLst>
                     <a:ext uri="{FF2B5EF4-FFF2-40B4-BE49-F238E27FC236}">
-                      <a16:creationId xmlns="" xmlns:a16="http://schemas.microsoft.com/office/drawing/2014/main" id="{6B4B2FC6-B34E-E14C-AAB5-91A1225D65F9}"/>
+                      <a16:creationId xmlns:a16="http://schemas.microsoft.com/office/drawing/2014/main" xmlns="" id="{6B4B2FC6-B34E-E14C-AAB5-91A1225D65F9}"/>
                     </a:ext>
                   </a:extLst>
                 </p:cNvPr>
@@ -14216,7 +14115,7 @@
                 <p:cNvPr id="188" name="Picture 187">
                   <a:extLst>
                     <a:ext uri="{FF2B5EF4-FFF2-40B4-BE49-F238E27FC236}">
-                      <a16:creationId xmlns="" xmlns:a16="http://schemas.microsoft.com/office/drawing/2014/main" id="{B3C195FE-953F-3940-9988-4B3634040E0C}"/>
+                      <a16:creationId xmlns:a16="http://schemas.microsoft.com/office/drawing/2014/main" xmlns="" id="{B3C195FE-953F-3940-9988-4B3634040E0C}"/>
                     </a:ext>
                   </a:extLst>
                 </p:cNvPr>
@@ -14252,7 +14151,7 @@
                 <p:cNvPr id="189" name="Group 188">
                   <a:extLst>
                     <a:ext uri="{FF2B5EF4-FFF2-40B4-BE49-F238E27FC236}">
-                      <a16:creationId xmlns="" xmlns:a16="http://schemas.microsoft.com/office/drawing/2014/main" id="{77FC2879-9058-BC43-B7FA-A78EC4E743C6}"/>
+                      <a16:creationId xmlns:a16="http://schemas.microsoft.com/office/drawing/2014/main" xmlns="" id="{77FC2879-9058-BC43-B7FA-A78EC4E743C6}"/>
                     </a:ext>
                   </a:extLst>
                 </p:cNvPr>
@@ -14272,7 +14171,7 @@
                   <p:cNvPr id="226" name="Picture 225">
                     <a:extLst>
                       <a:ext uri="{FF2B5EF4-FFF2-40B4-BE49-F238E27FC236}">
-                        <a16:creationId xmlns="" xmlns:a16="http://schemas.microsoft.com/office/drawing/2014/main" id="{677AE286-4A05-C74B-A277-B7C8F1333F72}"/>
+                        <a16:creationId xmlns:a16="http://schemas.microsoft.com/office/drawing/2014/main" xmlns="" id="{677AE286-4A05-C74B-A277-B7C8F1333F72}"/>
                       </a:ext>
                     </a:extLst>
                   </p:cNvPr>
@@ -14308,7 +14207,7 @@
                   <p:cNvPr id="227" name="Picture 226">
                     <a:extLst>
                       <a:ext uri="{FF2B5EF4-FFF2-40B4-BE49-F238E27FC236}">
-                        <a16:creationId xmlns="" xmlns:a16="http://schemas.microsoft.com/office/drawing/2014/main" id="{39E47AAB-4932-5D44-9F1B-F70FCA1AD131}"/>
+                        <a16:creationId xmlns:a16="http://schemas.microsoft.com/office/drawing/2014/main" xmlns="" id="{39E47AAB-4932-5D44-9F1B-F70FCA1AD131}"/>
                       </a:ext>
                     </a:extLst>
                   </p:cNvPr>
@@ -14344,7 +14243,7 @@
                   <p:cNvPr id="228" name="Picture 227">
                     <a:extLst>
                       <a:ext uri="{FF2B5EF4-FFF2-40B4-BE49-F238E27FC236}">
-                        <a16:creationId xmlns="" xmlns:a16="http://schemas.microsoft.com/office/drawing/2014/main" id="{03848DBF-E7A7-0549-A7CC-0D92DDB7F204}"/>
+                        <a16:creationId xmlns:a16="http://schemas.microsoft.com/office/drawing/2014/main" xmlns="" id="{03848DBF-E7A7-0549-A7CC-0D92DDB7F204}"/>
                       </a:ext>
                     </a:extLst>
                   </p:cNvPr>
@@ -14381,7 +14280,7 @@
                 <p:cNvPr id="190" name="Straight Connector 189">
                   <a:extLst>
                     <a:ext uri="{FF2B5EF4-FFF2-40B4-BE49-F238E27FC236}">
-                      <a16:creationId xmlns="" xmlns:a16="http://schemas.microsoft.com/office/drawing/2014/main" id="{37942414-129D-834B-87DD-62CA8F703269}"/>
+                      <a16:creationId xmlns:a16="http://schemas.microsoft.com/office/drawing/2014/main" xmlns="" id="{37942414-129D-834B-87DD-62CA8F703269}"/>
                     </a:ext>
                   </a:extLst>
                 </p:cNvPr>
@@ -14446,7 +14345,7 @@
                 <p:cNvPr id="191" name="Rectangle 190">
                   <a:extLst>
                     <a:ext uri="{FF2B5EF4-FFF2-40B4-BE49-F238E27FC236}">
-                      <a16:creationId xmlns="" xmlns:a16="http://schemas.microsoft.com/office/drawing/2014/main" id="{7E0F0C09-5560-064D-84F4-0D5D269B5EF4}"/>
+                      <a16:creationId xmlns:a16="http://schemas.microsoft.com/office/drawing/2014/main" xmlns="" id="{7E0F0C09-5560-064D-84F4-0D5D269B5EF4}"/>
                     </a:ext>
                   </a:extLst>
                 </p:cNvPr>
@@ -14515,7 +14414,7 @@
                 <p:cNvPr id="221" name="Rectangle 220">
                   <a:extLst>
                     <a:ext uri="{FF2B5EF4-FFF2-40B4-BE49-F238E27FC236}">
-                      <a16:creationId xmlns="" xmlns:a16="http://schemas.microsoft.com/office/drawing/2014/main" id="{67887162-218A-A94E-8723-7E3A38D3887B}"/>
+                      <a16:creationId xmlns:a16="http://schemas.microsoft.com/office/drawing/2014/main" xmlns="" id="{67887162-218A-A94E-8723-7E3A38D3887B}"/>
                     </a:ext>
                   </a:extLst>
                 </p:cNvPr>
@@ -14584,7 +14483,7 @@
                 <p:cNvPr id="222" name="Rectangle 221">
                   <a:extLst>
                     <a:ext uri="{FF2B5EF4-FFF2-40B4-BE49-F238E27FC236}">
-                      <a16:creationId xmlns="" xmlns:a16="http://schemas.microsoft.com/office/drawing/2014/main" id="{574F78D5-84BD-2147-82E2-67B0E8C03103}"/>
+                      <a16:creationId xmlns:a16="http://schemas.microsoft.com/office/drawing/2014/main" xmlns="" id="{574F78D5-84BD-2147-82E2-67B0E8C03103}"/>
                     </a:ext>
                   </a:extLst>
                 </p:cNvPr>
@@ -14653,7 +14552,7 @@
                 <p:cNvPr id="223" name="Group 222">
                   <a:extLst>
                     <a:ext uri="{FF2B5EF4-FFF2-40B4-BE49-F238E27FC236}">
-                      <a16:creationId xmlns="" xmlns:a16="http://schemas.microsoft.com/office/drawing/2014/main" id="{29558640-827B-1A45-8D7F-F0B6392377F4}"/>
+                      <a16:creationId xmlns:a16="http://schemas.microsoft.com/office/drawing/2014/main" xmlns="" id="{29558640-827B-1A45-8D7F-F0B6392377F4}"/>
                     </a:ext>
                   </a:extLst>
                 </p:cNvPr>
@@ -14673,7 +14572,7 @@
                   <p:cNvPr id="224" name="Picture 223">
                     <a:extLst>
                       <a:ext uri="{FF2B5EF4-FFF2-40B4-BE49-F238E27FC236}">
-                        <a16:creationId xmlns="" xmlns:a16="http://schemas.microsoft.com/office/drawing/2014/main" id="{7D605CEB-6CCF-174D-9A0C-5178FEDB61C3}"/>
+                        <a16:creationId xmlns:a16="http://schemas.microsoft.com/office/drawing/2014/main" xmlns="" id="{7D605CEB-6CCF-174D-9A0C-5178FEDB61C3}"/>
                       </a:ext>
                     </a:extLst>
                   </p:cNvPr>
@@ -14716,7 +14615,7 @@
                   <p:cNvPr id="225" name="Rectangle 224">
                     <a:extLst>
                       <a:ext uri="{FF2B5EF4-FFF2-40B4-BE49-F238E27FC236}">
-                        <a16:creationId xmlns="" xmlns:a16="http://schemas.microsoft.com/office/drawing/2014/main" id="{CD8A4BAA-AFEB-5C44-B8C7-AD0439728A06}"/>
+                        <a16:creationId xmlns:a16="http://schemas.microsoft.com/office/drawing/2014/main" xmlns="" id="{CD8A4BAA-AFEB-5C44-B8C7-AD0439728A06}"/>
                       </a:ext>
                     </a:extLst>
                   </p:cNvPr>
@@ -14773,7 +14672,7 @@
               <p:cNvPr id="169" name="Rectangle 168">
                 <a:extLst>
                   <a:ext uri="{FF2B5EF4-FFF2-40B4-BE49-F238E27FC236}">
-                    <a16:creationId xmlns="" xmlns:a16="http://schemas.microsoft.com/office/drawing/2014/main" id="{C638B7AD-1CCB-344B-90A7-6AD228607390}"/>
+                    <a16:creationId xmlns:a16="http://schemas.microsoft.com/office/drawing/2014/main" xmlns="" id="{C638B7AD-1CCB-344B-90A7-6AD228607390}"/>
                   </a:ext>
                 </a:extLst>
               </p:cNvPr>
@@ -14826,7 +14725,7 @@
               <p:cNvPr id="170" name="Rectangle 169">
                 <a:extLst>
                   <a:ext uri="{FF2B5EF4-FFF2-40B4-BE49-F238E27FC236}">
-                    <a16:creationId xmlns="" xmlns:a16="http://schemas.microsoft.com/office/drawing/2014/main" id="{029B660A-EF35-7F47-B2E4-6388AAA8773F}"/>
+                    <a16:creationId xmlns:a16="http://schemas.microsoft.com/office/drawing/2014/main" xmlns="" id="{029B660A-EF35-7F47-B2E4-6388AAA8773F}"/>
                   </a:ext>
                 </a:extLst>
               </p:cNvPr>
@@ -14892,7 +14791,7 @@
               <p:cNvPr id="171" name="Rectangle 170">
                 <a:extLst>
                   <a:ext uri="{FF2B5EF4-FFF2-40B4-BE49-F238E27FC236}">
-                    <a16:creationId xmlns="" xmlns:a16="http://schemas.microsoft.com/office/drawing/2014/main" id="{5C366557-F60D-8B4C-BB9C-4D09899ED066}"/>
+                    <a16:creationId xmlns:a16="http://schemas.microsoft.com/office/drawing/2014/main" xmlns="" id="{5C366557-F60D-8B4C-BB9C-4D09899ED066}"/>
                   </a:ext>
                 </a:extLst>
               </p:cNvPr>
@@ -14943,7 +14842,7 @@
               <p:cNvPr id="172" name="Rectangle 171">
                 <a:extLst>
                   <a:ext uri="{FF2B5EF4-FFF2-40B4-BE49-F238E27FC236}">
-                    <a16:creationId xmlns="" xmlns:a16="http://schemas.microsoft.com/office/drawing/2014/main" id="{6279CB0B-90EE-E949-B2CD-7BD3106D5A65}"/>
+                    <a16:creationId xmlns:a16="http://schemas.microsoft.com/office/drawing/2014/main" xmlns="" id="{6279CB0B-90EE-E949-B2CD-7BD3106D5A65}"/>
                   </a:ext>
                 </a:extLst>
               </p:cNvPr>
@@ -14997,7 +14896,7 @@
           <p:cNvPr id="234" name="Rounded Rectangle 233">
             <a:extLst>
               <a:ext uri="{FF2B5EF4-FFF2-40B4-BE49-F238E27FC236}">
-                <a16:creationId xmlns="" xmlns:a16="http://schemas.microsoft.com/office/drawing/2014/main" id="{141AB4C3-853E-1440-9794-8C4C6FF706CF}"/>
+                <a16:creationId xmlns:a16="http://schemas.microsoft.com/office/drawing/2014/main" xmlns="" id="{141AB4C3-853E-1440-9794-8C4C6FF706CF}"/>
               </a:ext>
             </a:extLst>
           </p:cNvPr>

</xml_diff>

<commit_message>
Fix typo + update vee.vee.png to make it fully transparent
</commit_message>
<xml_diff>
--- a/overview/images/vee.pptx
+++ b/overview/images/vee.pptx
@@ -239,7 +239,7 @@
               <a:rPr lang="fr-FR" smtClean="0">
                 <a:latin typeface="Calibri Regular" charset="0"/>
               </a:rPr>
-              <a:t>avril 23</a:t>
+              <a:t>octobre 24</a:t>
             </a:fld>
             <a:endParaRPr lang="en-US" dirty="0">
               <a:latin typeface="Calibri Regular" charset="0"/>
@@ -418,7 +418,7 @@
             <a:fld id="{79958FA1-9FE8-F149-AB4B-7DC9950B39E9}" type="datetime6">
               <a:rPr lang="fr-FR" smtClean="0"/>
               <a:pPr/>
-              <a:t>avril 23</a:t>
+              <a:t>octobre 24</a:t>
             </a:fld>
             <a:endParaRPr lang="en-US" dirty="0"/>
           </a:p>
@@ -6257,7 +6257,7 @@
           <p:cNvPr id="14" name="Slide Number Placeholder 5">
             <a:extLst>
               <a:ext uri="{FF2B5EF4-FFF2-40B4-BE49-F238E27FC236}">
-                <a16:creationId xmlns:a16="http://schemas.microsoft.com/office/drawing/2014/main" xmlns="" id="{D6A5EA0A-9DA9-564F-8F7D-CF263DB84C39}"/>
+                <a16:creationId xmlns:a16="http://schemas.microsoft.com/office/drawing/2014/main" id="{D6A5EA0A-9DA9-564F-8F7D-CF263DB84C39}"/>
               </a:ext>
             </a:extLst>
           </p:cNvPr>
@@ -6425,7 +6425,7 @@
           <p:cNvPr id="21" name="Straight Connector 20">
             <a:extLst>
               <a:ext uri="{FF2B5EF4-FFF2-40B4-BE49-F238E27FC236}">
-                <a16:creationId xmlns:a16="http://schemas.microsoft.com/office/drawing/2014/main" xmlns="" id="{F4443C96-B82D-F449-A71B-02134B6BB207}"/>
+                <a16:creationId xmlns:a16="http://schemas.microsoft.com/office/drawing/2014/main" id="{F4443C96-B82D-F449-A71B-02134B6BB207}"/>
               </a:ext>
             </a:extLst>
           </p:cNvPr>
@@ -6936,7 +6936,7 @@
           <p:cNvPr id="75" name="Arc 74">
             <a:extLst>
               <a:ext uri="{FF2B5EF4-FFF2-40B4-BE49-F238E27FC236}">
-                <a16:creationId xmlns:a16="http://schemas.microsoft.com/office/drawing/2014/main" xmlns="" id="{060453BB-F2FC-A243-9739-B2863E6DCBA0}"/>
+                <a16:creationId xmlns:a16="http://schemas.microsoft.com/office/drawing/2014/main" id="{060453BB-F2FC-A243-9739-B2863E6DCBA0}"/>
               </a:ext>
             </a:extLst>
           </p:cNvPr>
@@ -6990,7 +6990,7 @@
           <p:cNvPr id="76" name="Arc 75">
             <a:extLst>
               <a:ext uri="{FF2B5EF4-FFF2-40B4-BE49-F238E27FC236}">
-                <a16:creationId xmlns:a16="http://schemas.microsoft.com/office/drawing/2014/main" xmlns="" id="{082EFA91-DD81-C447-8CF4-B191FF92FDC2}"/>
+                <a16:creationId xmlns:a16="http://schemas.microsoft.com/office/drawing/2014/main" id="{082EFA91-DD81-C447-8CF4-B191FF92FDC2}"/>
               </a:ext>
             </a:extLst>
           </p:cNvPr>
@@ -7044,7 +7044,7 @@
           <p:cNvPr id="77" name="Snip Same Side Corner Rectangle 76">
             <a:extLst>
               <a:ext uri="{FF2B5EF4-FFF2-40B4-BE49-F238E27FC236}">
-                <a16:creationId xmlns:a16="http://schemas.microsoft.com/office/drawing/2014/main" xmlns="" id="{93C230A8-43EB-B546-B305-CC8297598AE1}"/>
+                <a16:creationId xmlns:a16="http://schemas.microsoft.com/office/drawing/2014/main" id="{93C230A8-43EB-B546-B305-CC8297598AE1}"/>
               </a:ext>
             </a:extLst>
           </p:cNvPr>
@@ -7114,7 +7114,7 @@
           <p:cNvPr id="78" name="Rounded Rectangle 77">
             <a:extLst>
               <a:ext uri="{FF2B5EF4-FFF2-40B4-BE49-F238E27FC236}">
-                <a16:creationId xmlns:a16="http://schemas.microsoft.com/office/drawing/2014/main" xmlns="" id="{2AF5A412-FF36-A24E-9A06-0B5A1F78F311}"/>
+                <a16:creationId xmlns:a16="http://schemas.microsoft.com/office/drawing/2014/main" id="{2AF5A412-FF36-A24E-9A06-0B5A1F78F311}"/>
               </a:ext>
             </a:extLst>
           </p:cNvPr>
@@ -7184,7 +7184,7 @@
           <p:cNvPr id="79" name="Rounded Rectangle 78">
             <a:extLst>
               <a:ext uri="{FF2B5EF4-FFF2-40B4-BE49-F238E27FC236}">
-                <a16:creationId xmlns:a16="http://schemas.microsoft.com/office/drawing/2014/main" xmlns="" id="{E3377285-D0B9-EA42-A462-097A2767D60F}"/>
+                <a16:creationId xmlns:a16="http://schemas.microsoft.com/office/drawing/2014/main" id="{E3377285-D0B9-EA42-A462-097A2767D60F}"/>
               </a:ext>
             </a:extLst>
           </p:cNvPr>
@@ -7254,7 +7254,7 @@
           <p:cNvPr id="80" name="Rounded Rectangle 79">
             <a:extLst>
               <a:ext uri="{FF2B5EF4-FFF2-40B4-BE49-F238E27FC236}">
-                <a16:creationId xmlns:a16="http://schemas.microsoft.com/office/drawing/2014/main" xmlns="" id="{8D4F4F48-B4E3-A841-AF8E-407BA63037C3}"/>
+                <a16:creationId xmlns:a16="http://schemas.microsoft.com/office/drawing/2014/main" id="{8D4F4F48-B4E3-A841-AF8E-407BA63037C3}"/>
               </a:ext>
             </a:extLst>
           </p:cNvPr>
@@ -7345,7 +7345,7 @@
           <p:cNvPr id="81" name="Rounded Rectangle 80">
             <a:extLst>
               <a:ext uri="{FF2B5EF4-FFF2-40B4-BE49-F238E27FC236}">
-                <a16:creationId xmlns:a16="http://schemas.microsoft.com/office/drawing/2014/main" xmlns="" id="{7625AF1C-C148-7943-8936-2189C6B4B3C8}"/>
+                <a16:creationId xmlns:a16="http://schemas.microsoft.com/office/drawing/2014/main" id="{7625AF1C-C148-7943-8936-2189C6B4B3C8}"/>
               </a:ext>
             </a:extLst>
           </p:cNvPr>
@@ -7426,7 +7426,7 @@
           <p:cNvPr id="82" name="Rounded Rectangle 81">
             <a:extLst>
               <a:ext uri="{FF2B5EF4-FFF2-40B4-BE49-F238E27FC236}">
-                <a16:creationId xmlns:a16="http://schemas.microsoft.com/office/drawing/2014/main" xmlns="" id="{3F914E6A-E96D-D447-AA1C-252B914055B1}"/>
+                <a16:creationId xmlns:a16="http://schemas.microsoft.com/office/drawing/2014/main" id="{3F914E6A-E96D-D447-AA1C-252B914055B1}"/>
               </a:ext>
             </a:extLst>
           </p:cNvPr>
@@ -7496,7 +7496,7 @@
           <p:cNvPr id="83" name="Rounded Rectangle 370">
             <a:extLst>
               <a:ext uri="{FF2B5EF4-FFF2-40B4-BE49-F238E27FC236}">
-                <a16:creationId xmlns:a16="http://schemas.microsoft.com/office/drawing/2014/main" xmlns="" id="{F2B17FA4-3633-F343-9E0C-1B0CEF8E5B3E}"/>
+                <a16:creationId xmlns:a16="http://schemas.microsoft.com/office/drawing/2014/main" id="{F2B17FA4-3633-F343-9E0C-1B0CEF8E5B3E}"/>
               </a:ext>
             </a:extLst>
           </p:cNvPr>
@@ -8415,7 +8415,7 @@
           <p:cNvPr id="84" name="Group 83">
             <a:extLst>
               <a:ext uri="{FF2B5EF4-FFF2-40B4-BE49-F238E27FC236}">
-                <a16:creationId xmlns:a16="http://schemas.microsoft.com/office/drawing/2014/main" xmlns="" id="{38EBC114-77E9-E74E-8263-4DEE0623CD13}"/>
+                <a16:creationId xmlns:a16="http://schemas.microsoft.com/office/drawing/2014/main" id="{38EBC114-77E9-E74E-8263-4DEE0623CD13}"/>
               </a:ext>
             </a:extLst>
           </p:cNvPr>
@@ -8435,7 +8435,7 @@
             <p:cNvPr id="85" name="Rounded Rectangle 84">
               <a:extLst>
                 <a:ext uri="{FF2B5EF4-FFF2-40B4-BE49-F238E27FC236}">
-                  <a16:creationId xmlns:a16="http://schemas.microsoft.com/office/drawing/2014/main" xmlns="" id="{1F97F6F7-77E0-0744-80AE-76419C4BA8A7}"/>
+                  <a16:creationId xmlns:a16="http://schemas.microsoft.com/office/drawing/2014/main" id="{1F97F6F7-77E0-0744-80AE-76419C4BA8A7}"/>
                 </a:ext>
               </a:extLst>
             </p:cNvPr>
@@ -8498,7 +8498,7 @@
             <p:cNvPr id="86" name="Rectangle 85">
               <a:extLst>
                 <a:ext uri="{FF2B5EF4-FFF2-40B4-BE49-F238E27FC236}">
-                  <a16:creationId xmlns:a16="http://schemas.microsoft.com/office/drawing/2014/main" xmlns="" id="{5C3DCC1D-F078-D640-A72E-2F0C0F72E809}"/>
+                  <a16:creationId xmlns:a16="http://schemas.microsoft.com/office/drawing/2014/main" id="{5C3DCC1D-F078-D640-A72E-2F0C0F72E809}"/>
                 </a:ext>
               </a:extLst>
             </p:cNvPr>
@@ -8567,7 +8567,7 @@
             <p:cNvPr id="87" name="Picture 86">
               <a:extLst>
                 <a:ext uri="{FF2B5EF4-FFF2-40B4-BE49-F238E27FC236}">
-                  <a16:creationId xmlns:a16="http://schemas.microsoft.com/office/drawing/2014/main" xmlns="" id="{54856715-B090-974C-B91F-9F1B41C116E3}"/>
+                  <a16:creationId xmlns:a16="http://schemas.microsoft.com/office/drawing/2014/main" id="{54856715-B090-974C-B91F-9F1B41C116E3}"/>
                 </a:ext>
               </a:extLst>
             </p:cNvPr>
@@ -8605,7 +8605,7 @@
           <p:cNvPr id="88" name="Rounded Rectangle 87">
             <a:extLst>
               <a:ext uri="{FF2B5EF4-FFF2-40B4-BE49-F238E27FC236}">
-                <a16:creationId xmlns:a16="http://schemas.microsoft.com/office/drawing/2014/main" xmlns="" id="{7272F29D-12F7-594D-BF44-2046F7A6E308}"/>
+                <a16:creationId xmlns:a16="http://schemas.microsoft.com/office/drawing/2014/main" id="{7272F29D-12F7-594D-BF44-2046F7A6E308}"/>
               </a:ext>
             </a:extLst>
           </p:cNvPr>
@@ -8680,7 +8680,7 @@
           <p:cNvPr id="89" name="Rounded Rectangle 88">
             <a:extLst>
               <a:ext uri="{FF2B5EF4-FFF2-40B4-BE49-F238E27FC236}">
-                <a16:creationId xmlns:a16="http://schemas.microsoft.com/office/drawing/2014/main" xmlns="" id="{BA11B1EC-3CFC-3D48-B5A4-505052591809}"/>
+                <a16:creationId xmlns:a16="http://schemas.microsoft.com/office/drawing/2014/main" id="{BA11B1EC-3CFC-3D48-B5A4-505052591809}"/>
               </a:ext>
             </a:extLst>
           </p:cNvPr>
@@ -8742,7 +8742,7 @@
           <p:cNvPr id="90" name="TextBox 89">
             <a:extLst>
               <a:ext uri="{FF2B5EF4-FFF2-40B4-BE49-F238E27FC236}">
-                <a16:creationId xmlns:a16="http://schemas.microsoft.com/office/drawing/2014/main" xmlns="" id="{B73A4B38-C063-604A-A476-A4B0EB81C503}"/>
+                <a16:creationId xmlns:a16="http://schemas.microsoft.com/office/drawing/2014/main" id="{B73A4B38-C063-604A-A476-A4B0EB81C503}"/>
               </a:ext>
             </a:extLst>
           </p:cNvPr>
@@ -8751,15 +8751,13 @@
         </p:nvSpPr>
         <p:spPr>
           <a:xfrm rot="16200000">
-            <a:off x="11009318" y="4615770"/>
+            <a:off x="11034719" y="4615770"/>
             <a:ext cx="947659" cy="442035"/>
           </a:xfrm>
           <a:prstGeom prst="rect">
             <a:avLst/>
           </a:prstGeom>
-          <a:solidFill>
-            <a:schemeClr val="bg1"/>
-          </a:solidFill>
+          <a:noFill/>
         </p:spPr>
         <p:txBody>
           <a:bodyPr wrap="square" tIns="36000" bIns="36000" rtlCol="0">
@@ -8793,7 +8791,7 @@
           <p:cNvPr id="91" name="Rounded Rectangle 90">
             <a:extLst>
               <a:ext uri="{FF2B5EF4-FFF2-40B4-BE49-F238E27FC236}">
-                <a16:creationId xmlns:a16="http://schemas.microsoft.com/office/drawing/2014/main" xmlns="" id="{ED404E0D-2795-B545-9375-BFB0E096DF34}"/>
+                <a16:creationId xmlns:a16="http://schemas.microsoft.com/office/drawing/2014/main" id="{ED404E0D-2795-B545-9375-BFB0E096DF34}"/>
               </a:ext>
             </a:extLst>
           </p:cNvPr>
@@ -8865,7 +8863,7 @@
           <p:cNvPr id="92" name="Rectangle 91">
             <a:extLst>
               <a:ext uri="{FF2B5EF4-FFF2-40B4-BE49-F238E27FC236}">
-                <a16:creationId xmlns:a16="http://schemas.microsoft.com/office/drawing/2014/main" xmlns="" id="{C6784975-6AC9-3B48-87AF-D23E163731B4}"/>
+                <a16:creationId xmlns:a16="http://schemas.microsoft.com/office/drawing/2014/main" id="{C6784975-6AC9-3B48-87AF-D23E163731B4}"/>
               </a:ext>
             </a:extLst>
           </p:cNvPr>
@@ -8916,7 +8914,7 @@
           <p:cNvPr id="93" name="Rounded Rectangle 92">
             <a:extLst>
               <a:ext uri="{FF2B5EF4-FFF2-40B4-BE49-F238E27FC236}">
-                <a16:creationId xmlns:a16="http://schemas.microsoft.com/office/drawing/2014/main" xmlns="" id="{33C5C744-2FA7-B748-B6C2-E72DF24B9D91}"/>
+                <a16:creationId xmlns:a16="http://schemas.microsoft.com/office/drawing/2014/main" id="{33C5C744-2FA7-B748-B6C2-E72DF24B9D91}"/>
               </a:ext>
             </a:extLst>
           </p:cNvPr>
@@ -8987,7 +8985,7 @@
           <p:cNvPr id="97" name="Group 96">
             <a:extLst>
               <a:ext uri="{FF2B5EF4-FFF2-40B4-BE49-F238E27FC236}">
-                <a16:creationId xmlns:a16="http://schemas.microsoft.com/office/drawing/2014/main" xmlns="" id="{5E2DAE89-A9BB-5C49-9AB6-C79F1DAEDE64}"/>
+                <a16:creationId xmlns:a16="http://schemas.microsoft.com/office/drawing/2014/main" id="{5E2DAE89-A9BB-5C49-9AB6-C79F1DAEDE64}"/>
               </a:ext>
             </a:extLst>
           </p:cNvPr>
@@ -9007,7 +9005,7 @@
             <p:cNvPr id="98" name="Rounded Rectangle 370">
               <a:extLst>
                 <a:ext uri="{FF2B5EF4-FFF2-40B4-BE49-F238E27FC236}">
-                  <a16:creationId xmlns:a16="http://schemas.microsoft.com/office/drawing/2014/main" xmlns="" id="{5706D4E4-A7C5-7F49-AB9B-9227A3278FCE}"/>
+                  <a16:creationId xmlns:a16="http://schemas.microsoft.com/office/drawing/2014/main" id="{5706D4E4-A7C5-7F49-AB9B-9227A3278FCE}"/>
                 </a:ext>
               </a:extLst>
             </p:cNvPr>
@@ -9926,7 +9924,7 @@
             <p:cNvPr id="99" name="Group 98">
               <a:extLst>
                 <a:ext uri="{FF2B5EF4-FFF2-40B4-BE49-F238E27FC236}">
-                  <a16:creationId xmlns:a16="http://schemas.microsoft.com/office/drawing/2014/main" xmlns="" id="{DED36E0C-22B4-8243-BE39-78DAEB6907B6}"/>
+                  <a16:creationId xmlns:a16="http://schemas.microsoft.com/office/drawing/2014/main" id="{DED36E0C-22B4-8243-BE39-78DAEB6907B6}"/>
                 </a:ext>
               </a:extLst>
             </p:cNvPr>
@@ -9946,7 +9944,7 @@
               <p:cNvPr id="100" name="Rounded Rectangle 99">
                 <a:extLst>
                   <a:ext uri="{FF2B5EF4-FFF2-40B4-BE49-F238E27FC236}">
-                    <a16:creationId xmlns:a16="http://schemas.microsoft.com/office/drawing/2014/main" xmlns="" id="{28E4897E-BFB0-C447-B1A1-C6E81F12FAB8}"/>
+                    <a16:creationId xmlns:a16="http://schemas.microsoft.com/office/drawing/2014/main" id="{28E4897E-BFB0-C447-B1A1-C6E81F12FAB8}"/>
                   </a:ext>
                 </a:extLst>
               </p:cNvPr>
@@ -10007,7 +10005,7 @@
               <p:cNvPr id="101" name="Group 100">
                 <a:extLst>
                   <a:ext uri="{FF2B5EF4-FFF2-40B4-BE49-F238E27FC236}">
-                    <a16:creationId xmlns:a16="http://schemas.microsoft.com/office/drawing/2014/main" xmlns="" id="{4F377B71-BB85-E84C-B24D-795DECA3A7C6}"/>
+                    <a16:creationId xmlns:a16="http://schemas.microsoft.com/office/drawing/2014/main" id="{4F377B71-BB85-E84C-B24D-795DECA3A7C6}"/>
                   </a:ext>
                 </a:extLst>
               </p:cNvPr>
@@ -10027,7 +10025,7 @@
                 <p:cNvPr id="102" name="Picture 101">
                   <a:extLst>
                     <a:ext uri="{FF2B5EF4-FFF2-40B4-BE49-F238E27FC236}">
-                      <a16:creationId xmlns:a16="http://schemas.microsoft.com/office/drawing/2014/main" xmlns="" id="{E564ED05-6EB8-8240-92EE-0244288AB3F5}"/>
+                      <a16:creationId xmlns:a16="http://schemas.microsoft.com/office/drawing/2014/main" id="{E564ED05-6EB8-8240-92EE-0244288AB3F5}"/>
                     </a:ext>
                   </a:extLst>
                 </p:cNvPr>
@@ -10063,7 +10061,7 @@
                 <p:cNvPr id="103" name="Picture 102">
                   <a:extLst>
                     <a:ext uri="{FF2B5EF4-FFF2-40B4-BE49-F238E27FC236}">
-                      <a16:creationId xmlns:a16="http://schemas.microsoft.com/office/drawing/2014/main" xmlns="" id="{B49F2F13-EC6A-1746-999F-3875CFB20DF3}"/>
+                      <a16:creationId xmlns:a16="http://schemas.microsoft.com/office/drawing/2014/main" id="{B49F2F13-EC6A-1746-999F-3875CFB20DF3}"/>
                     </a:ext>
                   </a:extLst>
                 </p:cNvPr>
@@ -10102,7 +10100,7 @@
           <p:cNvPr id="104" name="Rounded Rectangle 103">
             <a:extLst>
               <a:ext uri="{FF2B5EF4-FFF2-40B4-BE49-F238E27FC236}">
-                <a16:creationId xmlns:a16="http://schemas.microsoft.com/office/drawing/2014/main" xmlns="" id="{8DD58497-F07A-E746-9247-53C992B30583}"/>
+                <a16:creationId xmlns:a16="http://schemas.microsoft.com/office/drawing/2014/main" id="{8DD58497-F07A-E746-9247-53C992B30583}"/>
               </a:ext>
             </a:extLst>
           </p:cNvPr>
@@ -10177,7 +10175,7 @@
           <p:cNvPr id="105" name="TextBox 104">
             <a:extLst>
               <a:ext uri="{FF2B5EF4-FFF2-40B4-BE49-F238E27FC236}">
-                <a16:creationId xmlns:a16="http://schemas.microsoft.com/office/drawing/2014/main" xmlns="" id="{54B16BBA-07E7-D147-A0A6-FE706EAC5032}"/>
+                <a16:creationId xmlns:a16="http://schemas.microsoft.com/office/drawing/2014/main" id="{54B16BBA-07E7-D147-A0A6-FE706EAC5032}"/>
               </a:ext>
             </a:extLst>
           </p:cNvPr>
@@ -10192,9 +10190,7 @@
           <a:prstGeom prst="rect">
             <a:avLst/>
           </a:prstGeom>
-          <a:solidFill>
-            <a:schemeClr val="bg1"/>
-          </a:solidFill>
+          <a:noFill/>
         </p:spPr>
         <p:txBody>
           <a:bodyPr wrap="square" lIns="36000" tIns="36000" rIns="36000" bIns="36000" rtlCol="0">
@@ -10238,7 +10234,7 @@
           <p:cNvPr id="106" name="Rounded Rectangle 105">
             <a:extLst>
               <a:ext uri="{FF2B5EF4-FFF2-40B4-BE49-F238E27FC236}">
-                <a16:creationId xmlns:a16="http://schemas.microsoft.com/office/drawing/2014/main" xmlns="" id="{BBF629A8-41B9-9449-920C-365EE36C4615}"/>
+                <a16:creationId xmlns:a16="http://schemas.microsoft.com/office/drawing/2014/main" id="{BBF629A8-41B9-9449-920C-365EE36C4615}"/>
               </a:ext>
             </a:extLst>
           </p:cNvPr>
@@ -10316,7 +10312,7 @@
           <p:cNvPr id="107" name="Round Same Side Corner Rectangle 106">
             <a:extLst>
               <a:ext uri="{FF2B5EF4-FFF2-40B4-BE49-F238E27FC236}">
-                <a16:creationId xmlns:a16="http://schemas.microsoft.com/office/drawing/2014/main" xmlns="" id="{DFAD3B07-BCF9-904D-B49C-F7F1DBBAE3F1}"/>
+                <a16:creationId xmlns:a16="http://schemas.microsoft.com/office/drawing/2014/main" id="{DFAD3B07-BCF9-904D-B49C-F7F1DBBAE3F1}"/>
               </a:ext>
             </a:extLst>
           </p:cNvPr>
@@ -10375,7 +10371,7 @@
           <p:cNvPr id="108" name="Rounded Rectangle 107">
             <a:extLst>
               <a:ext uri="{FF2B5EF4-FFF2-40B4-BE49-F238E27FC236}">
-                <a16:creationId xmlns:a16="http://schemas.microsoft.com/office/drawing/2014/main" xmlns="" id="{18D2E7C0-602F-D644-BE76-5AD87004495C}"/>
+                <a16:creationId xmlns:a16="http://schemas.microsoft.com/office/drawing/2014/main" id="{18D2E7C0-602F-D644-BE76-5AD87004495C}"/>
               </a:ext>
             </a:extLst>
           </p:cNvPr>
@@ -10470,7 +10466,7 @@
           <p:cNvPr id="109" name="Rounded Rectangle 108">
             <a:extLst>
               <a:ext uri="{FF2B5EF4-FFF2-40B4-BE49-F238E27FC236}">
-                <a16:creationId xmlns:a16="http://schemas.microsoft.com/office/drawing/2014/main" xmlns="" id="{4B7B3C4E-A531-344F-8071-988166080BC9}"/>
+                <a16:creationId xmlns:a16="http://schemas.microsoft.com/office/drawing/2014/main" id="{4B7B3C4E-A531-344F-8071-988166080BC9}"/>
               </a:ext>
             </a:extLst>
           </p:cNvPr>
@@ -10554,7 +10550,7 @@
           <p:cNvPr id="110" name="Picture 109">
             <a:extLst>
               <a:ext uri="{FF2B5EF4-FFF2-40B4-BE49-F238E27FC236}">
-                <a16:creationId xmlns:a16="http://schemas.microsoft.com/office/drawing/2014/main" xmlns="" id="{D3436B46-A935-CB45-87ED-5240694C8454}"/>
+                <a16:creationId xmlns:a16="http://schemas.microsoft.com/office/drawing/2014/main" id="{D3436B46-A935-CB45-87ED-5240694C8454}"/>
               </a:ext>
             </a:extLst>
           </p:cNvPr>
@@ -10590,7 +10586,7 @@
           <p:cNvPr id="111" name="Rounded Rectangle 110">
             <a:extLst>
               <a:ext uri="{FF2B5EF4-FFF2-40B4-BE49-F238E27FC236}">
-                <a16:creationId xmlns:a16="http://schemas.microsoft.com/office/drawing/2014/main" xmlns="" id="{95F3D14D-9F46-7A41-ABE3-8A82BDB80A6C}"/>
+                <a16:creationId xmlns:a16="http://schemas.microsoft.com/office/drawing/2014/main" id="{95F3D14D-9F46-7A41-ABE3-8A82BDB80A6C}"/>
               </a:ext>
             </a:extLst>
           </p:cNvPr>
@@ -10851,7 +10847,7 @@
           <p:cNvPr id="112" name="Rounded Rectangle 111">
             <a:extLst>
               <a:ext uri="{FF2B5EF4-FFF2-40B4-BE49-F238E27FC236}">
-                <a16:creationId xmlns:a16="http://schemas.microsoft.com/office/drawing/2014/main" xmlns="" id="{58F61A96-8B69-1C4D-B6A8-2472AC93EE91}"/>
+                <a16:creationId xmlns:a16="http://schemas.microsoft.com/office/drawing/2014/main" id="{58F61A96-8B69-1C4D-B6A8-2472AC93EE91}"/>
               </a:ext>
             </a:extLst>
           </p:cNvPr>
@@ -10907,7 +10903,7 @@
               </a:spcAft>
             </a:pPr>
             <a:r>
-              <a:rPr lang="en-US" sz="1600" b="1" dirty="0" smtClean="0">
+              <a:rPr lang="en-US" sz="1600" b="1" dirty="0">
                 <a:solidFill>
                   <a:schemeClr val="tx1"/>
                 </a:solidFill>
@@ -10933,7 +10929,7 @@
           <p:cNvPr id="113" name="Group 112">
             <a:extLst>
               <a:ext uri="{FF2B5EF4-FFF2-40B4-BE49-F238E27FC236}">
-                <a16:creationId xmlns:a16="http://schemas.microsoft.com/office/drawing/2014/main" xmlns="" id="{77142C24-5D87-0B40-BF8D-EBB84104CC3F}"/>
+                <a16:creationId xmlns:a16="http://schemas.microsoft.com/office/drawing/2014/main" id="{77142C24-5D87-0B40-BF8D-EBB84104CC3F}"/>
               </a:ext>
             </a:extLst>
           </p:cNvPr>
@@ -10953,7 +10949,7 @@
             <p:cNvPr id="114" name="Picture 113">
               <a:extLst>
                 <a:ext uri="{FF2B5EF4-FFF2-40B4-BE49-F238E27FC236}">
-                  <a16:creationId xmlns:a16="http://schemas.microsoft.com/office/drawing/2014/main" xmlns="" id="{32E4AC22-06B3-A545-9D10-372457BB573A}"/>
+                  <a16:creationId xmlns:a16="http://schemas.microsoft.com/office/drawing/2014/main" id="{32E4AC22-06B3-A545-9D10-372457BB573A}"/>
                 </a:ext>
               </a:extLst>
             </p:cNvPr>
@@ -10996,7 +10992,7 @@
             <p:cNvPr id="115" name="Picture 114">
               <a:extLst>
                 <a:ext uri="{FF2B5EF4-FFF2-40B4-BE49-F238E27FC236}">
-                  <a16:creationId xmlns:a16="http://schemas.microsoft.com/office/drawing/2014/main" xmlns="" id="{875D89A6-4766-0045-B8BB-4B029D8381AC}"/>
+                  <a16:creationId xmlns:a16="http://schemas.microsoft.com/office/drawing/2014/main" id="{875D89A6-4766-0045-B8BB-4B029D8381AC}"/>
                 </a:ext>
               </a:extLst>
             </p:cNvPr>
@@ -11033,7 +11029,7 @@
           <p:cNvPr id="116" name="Group 115">
             <a:extLst>
               <a:ext uri="{FF2B5EF4-FFF2-40B4-BE49-F238E27FC236}">
-                <a16:creationId xmlns:a16="http://schemas.microsoft.com/office/drawing/2014/main" xmlns="" id="{9E4A3087-982E-5D4F-A335-B035C925B29C}"/>
+                <a16:creationId xmlns:a16="http://schemas.microsoft.com/office/drawing/2014/main" id="{9E4A3087-982E-5D4F-A335-B035C925B29C}"/>
               </a:ext>
             </a:extLst>
           </p:cNvPr>
@@ -11053,7 +11049,7 @@
             <p:cNvPr id="117" name="Picture 116">
               <a:extLst>
                 <a:ext uri="{FF2B5EF4-FFF2-40B4-BE49-F238E27FC236}">
-                  <a16:creationId xmlns:a16="http://schemas.microsoft.com/office/drawing/2014/main" xmlns="" id="{15EA6F1A-0A35-B54F-BC28-5915A895D138}"/>
+                  <a16:creationId xmlns:a16="http://schemas.microsoft.com/office/drawing/2014/main" id="{15EA6F1A-0A35-B54F-BC28-5915A895D138}"/>
                 </a:ext>
               </a:extLst>
             </p:cNvPr>
@@ -11096,7 +11092,7 @@
             <p:cNvPr id="118" name="Picture 117">
               <a:extLst>
                 <a:ext uri="{FF2B5EF4-FFF2-40B4-BE49-F238E27FC236}">
-                  <a16:creationId xmlns:a16="http://schemas.microsoft.com/office/drawing/2014/main" xmlns="" id="{C4A0248F-CBA6-654D-A0ED-79E4F1C9F66A}"/>
+                  <a16:creationId xmlns:a16="http://schemas.microsoft.com/office/drawing/2014/main" id="{C4A0248F-CBA6-654D-A0ED-79E4F1C9F66A}"/>
                 </a:ext>
               </a:extLst>
             </p:cNvPr>
@@ -11133,7 +11129,7 @@
           <p:cNvPr id="119" name="Group 118">
             <a:extLst>
               <a:ext uri="{FF2B5EF4-FFF2-40B4-BE49-F238E27FC236}">
-                <a16:creationId xmlns:a16="http://schemas.microsoft.com/office/drawing/2014/main" xmlns="" id="{933413C6-2CE5-BA48-8FFE-1A53AF8B6A03}"/>
+                <a16:creationId xmlns:a16="http://schemas.microsoft.com/office/drawing/2014/main" id="{933413C6-2CE5-BA48-8FFE-1A53AF8B6A03}"/>
               </a:ext>
             </a:extLst>
           </p:cNvPr>
@@ -11153,7 +11149,7 @@
             <p:cNvPr id="120" name="Picture 119">
               <a:extLst>
                 <a:ext uri="{FF2B5EF4-FFF2-40B4-BE49-F238E27FC236}">
-                  <a16:creationId xmlns:a16="http://schemas.microsoft.com/office/drawing/2014/main" xmlns="" id="{6C00C220-6AA1-5841-8522-8076E14816B5}"/>
+                  <a16:creationId xmlns:a16="http://schemas.microsoft.com/office/drawing/2014/main" id="{6C00C220-6AA1-5841-8522-8076E14816B5}"/>
                 </a:ext>
               </a:extLst>
             </p:cNvPr>
@@ -11196,7 +11192,7 @@
             <p:cNvPr id="121" name="Picture 120">
               <a:extLst>
                 <a:ext uri="{FF2B5EF4-FFF2-40B4-BE49-F238E27FC236}">
-                  <a16:creationId xmlns:a16="http://schemas.microsoft.com/office/drawing/2014/main" xmlns="" id="{DAE69181-17B7-B345-9ED3-3CF3DEB5DA2D}"/>
+                  <a16:creationId xmlns:a16="http://schemas.microsoft.com/office/drawing/2014/main" id="{DAE69181-17B7-B345-9ED3-3CF3DEB5DA2D}"/>
                 </a:ext>
               </a:extLst>
             </p:cNvPr>
@@ -11233,7 +11229,7 @@
           <p:cNvPr id="122" name="Group 121">
             <a:extLst>
               <a:ext uri="{FF2B5EF4-FFF2-40B4-BE49-F238E27FC236}">
-                <a16:creationId xmlns:a16="http://schemas.microsoft.com/office/drawing/2014/main" xmlns="" id="{3EABABFF-AA2E-B049-9344-A0990317A37F}"/>
+                <a16:creationId xmlns:a16="http://schemas.microsoft.com/office/drawing/2014/main" id="{3EABABFF-AA2E-B049-9344-A0990317A37F}"/>
               </a:ext>
             </a:extLst>
           </p:cNvPr>
@@ -11253,7 +11249,7 @@
             <p:cNvPr id="123" name="Picture 122">
               <a:extLst>
                 <a:ext uri="{FF2B5EF4-FFF2-40B4-BE49-F238E27FC236}">
-                  <a16:creationId xmlns:a16="http://schemas.microsoft.com/office/drawing/2014/main" xmlns="" id="{820AA0B3-6BC7-5D45-BA69-C516DFF5928E}"/>
+                  <a16:creationId xmlns:a16="http://schemas.microsoft.com/office/drawing/2014/main" id="{820AA0B3-6BC7-5D45-BA69-C516DFF5928E}"/>
                 </a:ext>
               </a:extLst>
             </p:cNvPr>
@@ -11296,7 +11292,7 @@
             <p:cNvPr id="124" name="Picture 123">
               <a:extLst>
                 <a:ext uri="{FF2B5EF4-FFF2-40B4-BE49-F238E27FC236}">
-                  <a16:creationId xmlns:a16="http://schemas.microsoft.com/office/drawing/2014/main" xmlns="" id="{E0A8E789-0A84-7C41-9A3C-81FC919F7875}"/>
+                  <a16:creationId xmlns:a16="http://schemas.microsoft.com/office/drawing/2014/main" id="{E0A8E789-0A84-7C41-9A3C-81FC919F7875}"/>
                 </a:ext>
               </a:extLst>
             </p:cNvPr>
@@ -11333,7 +11329,7 @@
           <p:cNvPr id="125" name="Group 124">
             <a:extLst>
               <a:ext uri="{FF2B5EF4-FFF2-40B4-BE49-F238E27FC236}">
-                <a16:creationId xmlns:a16="http://schemas.microsoft.com/office/drawing/2014/main" xmlns="" id="{B5781DCD-8A1D-CF46-8967-ED7B5AA8FF0F}"/>
+                <a16:creationId xmlns:a16="http://schemas.microsoft.com/office/drawing/2014/main" id="{B5781DCD-8A1D-CF46-8967-ED7B5AA8FF0F}"/>
               </a:ext>
             </a:extLst>
           </p:cNvPr>
@@ -11353,7 +11349,7 @@
             <p:cNvPr id="126" name="Picture 125">
               <a:extLst>
                 <a:ext uri="{FF2B5EF4-FFF2-40B4-BE49-F238E27FC236}">
-                  <a16:creationId xmlns:a16="http://schemas.microsoft.com/office/drawing/2014/main" xmlns="" id="{73CC257F-E917-974B-9DFB-BB51D0C71019}"/>
+                  <a16:creationId xmlns:a16="http://schemas.microsoft.com/office/drawing/2014/main" id="{73CC257F-E917-974B-9DFB-BB51D0C71019}"/>
                 </a:ext>
               </a:extLst>
             </p:cNvPr>
@@ -11396,7 +11392,7 @@
             <p:cNvPr id="127" name="Picture 126">
               <a:extLst>
                 <a:ext uri="{FF2B5EF4-FFF2-40B4-BE49-F238E27FC236}">
-                  <a16:creationId xmlns:a16="http://schemas.microsoft.com/office/drawing/2014/main" xmlns="" id="{27ADF93B-75AA-D648-9E1A-11159A6BA70F}"/>
+                  <a16:creationId xmlns:a16="http://schemas.microsoft.com/office/drawing/2014/main" id="{27ADF93B-75AA-D648-9E1A-11159A6BA70F}"/>
                 </a:ext>
               </a:extLst>
             </p:cNvPr>
@@ -11433,7 +11429,7 @@
           <p:cNvPr id="128" name="Group 127">
             <a:extLst>
               <a:ext uri="{FF2B5EF4-FFF2-40B4-BE49-F238E27FC236}">
-                <a16:creationId xmlns:a16="http://schemas.microsoft.com/office/drawing/2014/main" xmlns="" id="{20599E41-236C-4F4E-BBE8-23C9F8364679}"/>
+                <a16:creationId xmlns:a16="http://schemas.microsoft.com/office/drawing/2014/main" id="{20599E41-236C-4F4E-BBE8-23C9F8364679}"/>
               </a:ext>
             </a:extLst>
           </p:cNvPr>
@@ -11453,7 +11449,7 @@
             <p:cNvPr id="129" name="Picture 128">
               <a:extLst>
                 <a:ext uri="{FF2B5EF4-FFF2-40B4-BE49-F238E27FC236}">
-                  <a16:creationId xmlns:a16="http://schemas.microsoft.com/office/drawing/2014/main" xmlns="" id="{C1A49675-44CC-F743-91E9-5F7E762E0B23}"/>
+                  <a16:creationId xmlns:a16="http://schemas.microsoft.com/office/drawing/2014/main" id="{C1A49675-44CC-F743-91E9-5F7E762E0B23}"/>
                 </a:ext>
               </a:extLst>
             </p:cNvPr>
@@ -11496,7 +11492,7 @@
             <p:cNvPr id="133" name="Picture 132">
               <a:extLst>
                 <a:ext uri="{FF2B5EF4-FFF2-40B4-BE49-F238E27FC236}">
-                  <a16:creationId xmlns:a16="http://schemas.microsoft.com/office/drawing/2014/main" xmlns="" id="{91ECA565-503B-FF49-9BE4-83784E803173}"/>
+                  <a16:creationId xmlns:a16="http://schemas.microsoft.com/office/drawing/2014/main" id="{91ECA565-503B-FF49-9BE4-83784E803173}"/>
                 </a:ext>
               </a:extLst>
             </p:cNvPr>
@@ -11533,7 +11529,7 @@
           <p:cNvPr id="135" name="Rounded Rectangle 134">
             <a:extLst>
               <a:ext uri="{FF2B5EF4-FFF2-40B4-BE49-F238E27FC236}">
-                <a16:creationId xmlns:a16="http://schemas.microsoft.com/office/drawing/2014/main" xmlns="" id="{16D80F87-C85C-E749-B7D1-E9D523AC3EE9}"/>
+                <a16:creationId xmlns:a16="http://schemas.microsoft.com/office/drawing/2014/main" id="{16D80F87-C85C-E749-B7D1-E9D523AC3EE9}"/>
               </a:ext>
             </a:extLst>
           </p:cNvPr>
@@ -11623,7 +11619,7 @@
           <p:cNvPr id="137" name="Rounded Rectangle 136">
             <a:extLst>
               <a:ext uri="{FF2B5EF4-FFF2-40B4-BE49-F238E27FC236}">
-                <a16:creationId xmlns:a16="http://schemas.microsoft.com/office/drawing/2014/main" xmlns="" id="{804CF3A3-388B-5049-99B5-BD0318407DCB}"/>
+                <a16:creationId xmlns:a16="http://schemas.microsoft.com/office/drawing/2014/main" id="{804CF3A3-388B-5049-99B5-BD0318407DCB}"/>
               </a:ext>
             </a:extLst>
           </p:cNvPr>
@@ -11707,7 +11703,7 @@
           <p:cNvPr id="138" name="Rounded Rectangle 137">
             <a:extLst>
               <a:ext uri="{FF2B5EF4-FFF2-40B4-BE49-F238E27FC236}">
-                <a16:creationId xmlns:a16="http://schemas.microsoft.com/office/drawing/2014/main" xmlns="" id="{7F4C19CA-9E49-EF41-811F-AB350E512E40}"/>
+                <a16:creationId xmlns:a16="http://schemas.microsoft.com/office/drawing/2014/main" id="{7F4C19CA-9E49-EF41-811F-AB350E512E40}"/>
               </a:ext>
             </a:extLst>
           </p:cNvPr>
@@ -11772,7 +11768,7 @@
           <p:cNvPr id="139" name="Rounded Rectangle 138">
             <a:extLst>
               <a:ext uri="{FF2B5EF4-FFF2-40B4-BE49-F238E27FC236}">
-                <a16:creationId xmlns:a16="http://schemas.microsoft.com/office/drawing/2014/main" xmlns="" id="{3CE4B3CF-1519-A949-8083-8DD3ED7F09F3}"/>
+                <a16:creationId xmlns:a16="http://schemas.microsoft.com/office/drawing/2014/main" id="{3CE4B3CF-1519-A949-8083-8DD3ED7F09F3}"/>
               </a:ext>
             </a:extLst>
           </p:cNvPr>
@@ -11846,7 +11842,7 @@
           <p:cNvPr id="140" name="Straight Connector 139">
             <a:extLst>
               <a:ext uri="{FF2B5EF4-FFF2-40B4-BE49-F238E27FC236}">
-                <a16:creationId xmlns:a16="http://schemas.microsoft.com/office/drawing/2014/main" xmlns="" id="{83D9A465-7F9A-D647-BB8D-95E7D93324C7}"/>
+                <a16:creationId xmlns:a16="http://schemas.microsoft.com/office/drawing/2014/main" id="{83D9A465-7F9A-D647-BB8D-95E7D93324C7}"/>
               </a:ext>
             </a:extLst>
           </p:cNvPr>
@@ -11890,7 +11886,7 @@
           <p:cNvPr id="142" name="Straight Connector 141">
             <a:extLst>
               <a:ext uri="{FF2B5EF4-FFF2-40B4-BE49-F238E27FC236}">
-                <a16:creationId xmlns:a16="http://schemas.microsoft.com/office/drawing/2014/main" xmlns="" id="{6F5E5DB1-CE8B-A743-812A-CD1FB067D597}"/>
+                <a16:creationId xmlns:a16="http://schemas.microsoft.com/office/drawing/2014/main" id="{6F5E5DB1-CE8B-A743-812A-CD1FB067D597}"/>
               </a:ext>
             </a:extLst>
           </p:cNvPr>
@@ -11945,7 +11941,7 @@
           <p:cNvPr id="143" name="Straight Connector 142">
             <a:extLst>
               <a:ext uri="{FF2B5EF4-FFF2-40B4-BE49-F238E27FC236}">
-                <a16:creationId xmlns:a16="http://schemas.microsoft.com/office/drawing/2014/main" xmlns="" id="{207454CF-6B05-EF42-B246-84D394D78949}"/>
+                <a16:creationId xmlns:a16="http://schemas.microsoft.com/office/drawing/2014/main" id="{207454CF-6B05-EF42-B246-84D394D78949}"/>
               </a:ext>
             </a:extLst>
           </p:cNvPr>
@@ -11989,7 +11985,7 @@
           <p:cNvPr id="144" name="Straight Connector 143">
             <a:extLst>
               <a:ext uri="{FF2B5EF4-FFF2-40B4-BE49-F238E27FC236}">
-                <a16:creationId xmlns:a16="http://schemas.microsoft.com/office/drawing/2014/main" xmlns="" id="{1C605778-F077-1B46-9AD6-7D0A17BBB927}"/>
+                <a16:creationId xmlns:a16="http://schemas.microsoft.com/office/drawing/2014/main" id="{1C605778-F077-1B46-9AD6-7D0A17BBB927}"/>
               </a:ext>
             </a:extLst>
           </p:cNvPr>
@@ -12033,7 +12029,7 @@
           <p:cNvPr id="145" name="Rounded Rectangle 144">
             <a:extLst>
               <a:ext uri="{FF2B5EF4-FFF2-40B4-BE49-F238E27FC236}">
-                <a16:creationId xmlns:a16="http://schemas.microsoft.com/office/drawing/2014/main" xmlns="" id="{59822B67-70F0-5E4E-93C4-F658B5D6D252}"/>
+                <a16:creationId xmlns:a16="http://schemas.microsoft.com/office/drawing/2014/main" id="{59822B67-70F0-5E4E-93C4-F658B5D6D252}"/>
               </a:ext>
             </a:extLst>
           </p:cNvPr>
@@ -12102,7 +12098,7 @@
           <p:cNvPr id="147" name="Straight Connector 146">
             <a:extLst>
               <a:ext uri="{FF2B5EF4-FFF2-40B4-BE49-F238E27FC236}">
-                <a16:creationId xmlns:a16="http://schemas.microsoft.com/office/drawing/2014/main" xmlns="" id="{6F5A09EE-4E9D-2D40-8839-EA4BC8B32AD6}"/>
+                <a16:creationId xmlns:a16="http://schemas.microsoft.com/office/drawing/2014/main" id="{6F5A09EE-4E9D-2D40-8839-EA4BC8B32AD6}"/>
               </a:ext>
             </a:extLst>
           </p:cNvPr>
@@ -12146,7 +12142,7 @@
           <p:cNvPr id="148" name="Rounded Rectangle 147">
             <a:extLst>
               <a:ext uri="{FF2B5EF4-FFF2-40B4-BE49-F238E27FC236}">
-                <a16:creationId xmlns:a16="http://schemas.microsoft.com/office/drawing/2014/main" xmlns="" id="{30B3DB3A-B9BC-4A43-BDD0-16B109726168}"/>
+                <a16:creationId xmlns:a16="http://schemas.microsoft.com/office/drawing/2014/main" id="{30B3DB3A-B9BC-4A43-BDD0-16B109726168}"/>
               </a:ext>
             </a:extLst>
           </p:cNvPr>
@@ -12213,7 +12209,7 @@
           <p:cNvPr id="149" name="Rounded Rectangle 148">
             <a:extLst>
               <a:ext uri="{FF2B5EF4-FFF2-40B4-BE49-F238E27FC236}">
-                <a16:creationId xmlns:a16="http://schemas.microsoft.com/office/drawing/2014/main" xmlns="" id="{E3876AA5-D2F0-3C4D-9850-9162AAE35B00}"/>
+                <a16:creationId xmlns:a16="http://schemas.microsoft.com/office/drawing/2014/main" id="{E3876AA5-D2F0-3C4D-9850-9162AAE35B00}"/>
               </a:ext>
             </a:extLst>
           </p:cNvPr>
@@ -12290,7 +12286,7 @@
           <p:cNvPr id="150" name="Rounded Rectangle 149">
             <a:extLst>
               <a:ext uri="{FF2B5EF4-FFF2-40B4-BE49-F238E27FC236}">
-                <a16:creationId xmlns:a16="http://schemas.microsoft.com/office/drawing/2014/main" xmlns="" id="{A351274A-1FF6-0142-B4E6-46962E82AFDB}"/>
+                <a16:creationId xmlns:a16="http://schemas.microsoft.com/office/drawing/2014/main" id="{A351274A-1FF6-0142-B4E6-46962E82AFDB}"/>
               </a:ext>
             </a:extLst>
           </p:cNvPr>
@@ -12364,7 +12360,7 @@
           <p:cNvPr id="151" name="Rounded Rectangle 150">
             <a:extLst>
               <a:ext uri="{FF2B5EF4-FFF2-40B4-BE49-F238E27FC236}">
-                <a16:creationId xmlns:a16="http://schemas.microsoft.com/office/drawing/2014/main" xmlns="" id="{FD735D03-280A-BC46-AF9D-DB74D8731533}"/>
+                <a16:creationId xmlns:a16="http://schemas.microsoft.com/office/drawing/2014/main" id="{FD735D03-280A-BC46-AF9D-DB74D8731533}"/>
               </a:ext>
             </a:extLst>
           </p:cNvPr>
@@ -12429,7 +12425,7 @@
           <p:cNvPr id="152" name="Rounded Rectangle 151">
             <a:extLst>
               <a:ext uri="{FF2B5EF4-FFF2-40B4-BE49-F238E27FC236}">
-                <a16:creationId xmlns:a16="http://schemas.microsoft.com/office/drawing/2014/main" xmlns="" id="{477342D7-6A05-E043-B17C-D0836B86CB21}"/>
+                <a16:creationId xmlns:a16="http://schemas.microsoft.com/office/drawing/2014/main" id="{477342D7-6A05-E043-B17C-D0836B86CB21}"/>
               </a:ext>
             </a:extLst>
           </p:cNvPr>
@@ -12494,7 +12490,7 @@
           <p:cNvPr id="153" name="Rounded Rectangle 152">
             <a:extLst>
               <a:ext uri="{FF2B5EF4-FFF2-40B4-BE49-F238E27FC236}">
-                <a16:creationId xmlns:a16="http://schemas.microsoft.com/office/drawing/2014/main" xmlns="" id="{8581AB5D-4FFE-2448-9666-CCC8276A4618}"/>
+                <a16:creationId xmlns:a16="http://schemas.microsoft.com/office/drawing/2014/main" id="{8581AB5D-4FFE-2448-9666-CCC8276A4618}"/>
               </a:ext>
             </a:extLst>
           </p:cNvPr>
@@ -12559,7 +12555,7 @@
           <p:cNvPr id="154" name="Rounded Rectangle 153">
             <a:extLst>
               <a:ext uri="{FF2B5EF4-FFF2-40B4-BE49-F238E27FC236}">
-                <a16:creationId xmlns:a16="http://schemas.microsoft.com/office/drawing/2014/main" xmlns="" id="{DE42D0F5-AD68-BB4D-A02B-0E83F442CE14}"/>
+                <a16:creationId xmlns:a16="http://schemas.microsoft.com/office/drawing/2014/main" id="{DE42D0F5-AD68-BB4D-A02B-0E83F442CE14}"/>
               </a:ext>
             </a:extLst>
           </p:cNvPr>
@@ -12624,7 +12620,7 @@
           <p:cNvPr id="155" name="Rounded Rectangle 154">
             <a:extLst>
               <a:ext uri="{FF2B5EF4-FFF2-40B4-BE49-F238E27FC236}">
-                <a16:creationId xmlns:a16="http://schemas.microsoft.com/office/drawing/2014/main" xmlns="" id="{9B536277-F17A-0648-9D79-C6E4BCD8677C}"/>
+                <a16:creationId xmlns:a16="http://schemas.microsoft.com/office/drawing/2014/main" id="{9B536277-F17A-0648-9D79-C6E4BCD8677C}"/>
               </a:ext>
             </a:extLst>
           </p:cNvPr>
@@ -12689,7 +12685,7 @@
           <p:cNvPr id="156" name="Rounded Rectangle 155">
             <a:extLst>
               <a:ext uri="{FF2B5EF4-FFF2-40B4-BE49-F238E27FC236}">
-                <a16:creationId xmlns:a16="http://schemas.microsoft.com/office/drawing/2014/main" xmlns="" id="{FB38770D-3B1E-2942-BB68-4B2196358FE5}"/>
+                <a16:creationId xmlns:a16="http://schemas.microsoft.com/office/drawing/2014/main" id="{FB38770D-3B1E-2942-BB68-4B2196358FE5}"/>
               </a:ext>
             </a:extLst>
           </p:cNvPr>
@@ -12758,7 +12754,7 @@
           <p:cNvPr id="157" name="Straight Connector 156">
             <a:extLst>
               <a:ext uri="{FF2B5EF4-FFF2-40B4-BE49-F238E27FC236}">
-                <a16:creationId xmlns:a16="http://schemas.microsoft.com/office/drawing/2014/main" xmlns="" id="{D90F438F-1E80-E641-BE3F-43431E029618}"/>
+                <a16:creationId xmlns:a16="http://schemas.microsoft.com/office/drawing/2014/main" id="{D90F438F-1E80-E641-BE3F-43431E029618}"/>
               </a:ext>
             </a:extLst>
           </p:cNvPr>
@@ -12802,7 +12798,7 @@
           <p:cNvPr id="158" name="Rounded Rectangle 157">
             <a:extLst>
               <a:ext uri="{FF2B5EF4-FFF2-40B4-BE49-F238E27FC236}">
-                <a16:creationId xmlns:a16="http://schemas.microsoft.com/office/drawing/2014/main" xmlns="" id="{5742A9BD-5E2B-A34C-8C6E-C8CF6CAB0138}"/>
+                <a16:creationId xmlns:a16="http://schemas.microsoft.com/office/drawing/2014/main" id="{5742A9BD-5E2B-A34C-8C6E-C8CF6CAB0138}"/>
               </a:ext>
             </a:extLst>
           </p:cNvPr>
@@ -12875,7 +12871,7 @@
           <p:cNvPr id="159" name="Rounded Rectangle 158">
             <a:extLst>
               <a:ext uri="{FF2B5EF4-FFF2-40B4-BE49-F238E27FC236}">
-                <a16:creationId xmlns:a16="http://schemas.microsoft.com/office/drawing/2014/main" xmlns="" id="{A1607D64-15E0-7044-A53C-BFE2E3E67748}"/>
+                <a16:creationId xmlns:a16="http://schemas.microsoft.com/office/drawing/2014/main" id="{A1607D64-15E0-7044-A53C-BFE2E3E67748}"/>
               </a:ext>
             </a:extLst>
           </p:cNvPr>
@@ -12940,7 +12936,7 @@
           <p:cNvPr id="160" name="Rounded Rectangle 159">
             <a:extLst>
               <a:ext uri="{FF2B5EF4-FFF2-40B4-BE49-F238E27FC236}">
-                <a16:creationId xmlns:a16="http://schemas.microsoft.com/office/drawing/2014/main" xmlns="" id="{E17EC56C-AC16-514D-914A-7C552702C47E}"/>
+                <a16:creationId xmlns:a16="http://schemas.microsoft.com/office/drawing/2014/main" id="{E17EC56C-AC16-514D-914A-7C552702C47E}"/>
               </a:ext>
             </a:extLst>
           </p:cNvPr>
@@ -13007,7 +13003,7 @@
           <p:cNvPr id="161" name="Rectangle 160">
             <a:extLst>
               <a:ext uri="{FF2B5EF4-FFF2-40B4-BE49-F238E27FC236}">
-                <a16:creationId xmlns:a16="http://schemas.microsoft.com/office/drawing/2014/main" xmlns="" id="{04FB3D77-0506-5F44-B52F-526D5B669669}"/>
+                <a16:creationId xmlns:a16="http://schemas.microsoft.com/office/drawing/2014/main" id="{04FB3D77-0506-5F44-B52F-526D5B669669}"/>
               </a:ext>
             </a:extLst>
           </p:cNvPr>
@@ -13058,7 +13054,7 @@
           <p:cNvPr id="162" name="Rectangle 161">
             <a:extLst>
               <a:ext uri="{FF2B5EF4-FFF2-40B4-BE49-F238E27FC236}">
-                <a16:creationId xmlns:a16="http://schemas.microsoft.com/office/drawing/2014/main" xmlns="" id="{0551A79A-857A-2341-8DDA-27E8E8DD0FBA}"/>
+                <a16:creationId xmlns:a16="http://schemas.microsoft.com/office/drawing/2014/main" id="{0551A79A-857A-2341-8DDA-27E8E8DD0FBA}"/>
               </a:ext>
             </a:extLst>
           </p:cNvPr>
@@ -13109,7 +13105,7 @@
           <p:cNvPr id="165" name="Group 164">
             <a:extLst>
               <a:ext uri="{FF2B5EF4-FFF2-40B4-BE49-F238E27FC236}">
-                <a16:creationId xmlns:a16="http://schemas.microsoft.com/office/drawing/2014/main" xmlns="" id="{B2093A1D-7C23-C14A-BA2D-CDD5BABDCA07}"/>
+                <a16:creationId xmlns:a16="http://schemas.microsoft.com/office/drawing/2014/main" id="{B2093A1D-7C23-C14A-BA2D-CDD5BABDCA07}"/>
               </a:ext>
             </a:extLst>
           </p:cNvPr>
@@ -13129,7 +13125,7 @@
             <p:cNvPr id="166" name="Rounded Rectangle 165">
               <a:extLst>
                 <a:ext uri="{FF2B5EF4-FFF2-40B4-BE49-F238E27FC236}">
-                  <a16:creationId xmlns:a16="http://schemas.microsoft.com/office/drawing/2014/main" xmlns="" id="{47515010-D167-C04A-AE31-C0E579A6C21A}"/>
+                  <a16:creationId xmlns:a16="http://schemas.microsoft.com/office/drawing/2014/main" id="{47515010-D167-C04A-AE31-C0E579A6C21A}"/>
                 </a:ext>
               </a:extLst>
             </p:cNvPr>
@@ -13183,7 +13179,7 @@
             <p:cNvPr id="167" name="Group 166">
               <a:extLst>
                 <a:ext uri="{FF2B5EF4-FFF2-40B4-BE49-F238E27FC236}">
-                  <a16:creationId xmlns:a16="http://schemas.microsoft.com/office/drawing/2014/main" xmlns="" id="{8875227B-C89E-BB4B-9A52-33FBFD691964}"/>
+                  <a16:creationId xmlns:a16="http://schemas.microsoft.com/office/drawing/2014/main" id="{8875227B-C89E-BB4B-9A52-33FBFD691964}"/>
                 </a:ext>
               </a:extLst>
             </p:cNvPr>
@@ -13203,7 +13199,7 @@
               <p:cNvPr id="168" name="Group 167">
                 <a:extLst>
                   <a:ext uri="{FF2B5EF4-FFF2-40B4-BE49-F238E27FC236}">
-                    <a16:creationId xmlns:a16="http://schemas.microsoft.com/office/drawing/2014/main" xmlns="" id="{7047DF6E-7500-0A49-A641-456FBD08492E}"/>
+                    <a16:creationId xmlns:a16="http://schemas.microsoft.com/office/drawing/2014/main" id="{7047DF6E-7500-0A49-A641-456FBD08492E}"/>
                   </a:ext>
                 </a:extLst>
               </p:cNvPr>
@@ -13223,7 +13219,7 @@
                 <p:cNvPr id="173" name="Picture 172">
                   <a:extLst>
                     <a:ext uri="{FF2B5EF4-FFF2-40B4-BE49-F238E27FC236}">
-                      <a16:creationId xmlns:a16="http://schemas.microsoft.com/office/drawing/2014/main" xmlns="" id="{E95E9309-044E-DB41-805C-FEE86D8E28AB}"/>
+                      <a16:creationId xmlns:a16="http://schemas.microsoft.com/office/drawing/2014/main" id="{E95E9309-044E-DB41-805C-FEE86D8E28AB}"/>
                     </a:ext>
                   </a:extLst>
                 </p:cNvPr>
@@ -13259,7 +13255,7 @@
                 <p:cNvPr id="174" name="Rectangle 173">
                   <a:extLst>
                     <a:ext uri="{FF2B5EF4-FFF2-40B4-BE49-F238E27FC236}">
-                      <a16:creationId xmlns:a16="http://schemas.microsoft.com/office/drawing/2014/main" xmlns="" id="{81974314-48B7-274D-A275-BAAF9058BEBB}"/>
+                      <a16:creationId xmlns:a16="http://schemas.microsoft.com/office/drawing/2014/main" id="{81974314-48B7-274D-A275-BAAF9058BEBB}"/>
                     </a:ext>
                   </a:extLst>
                 </p:cNvPr>
@@ -13326,7 +13322,7 @@
                 <p:cNvPr id="175" name="Elbow Connector 174">
                   <a:extLst>
                     <a:ext uri="{FF2B5EF4-FFF2-40B4-BE49-F238E27FC236}">
-                      <a16:creationId xmlns:a16="http://schemas.microsoft.com/office/drawing/2014/main" xmlns="" id="{64C460AB-2371-5741-A52C-1DD7FC51EFDF}"/>
+                      <a16:creationId xmlns:a16="http://schemas.microsoft.com/office/drawing/2014/main" id="{64C460AB-2371-5741-A52C-1DD7FC51EFDF}"/>
                     </a:ext>
                   </a:extLst>
                 </p:cNvPr>
@@ -13363,7 +13359,7 @@
                 <p:cNvPr id="176" name="Elbow Connector 175">
                   <a:extLst>
                     <a:ext uri="{FF2B5EF4-FFF2-40B4-BE49-F238E27FC236}">
-                      <a16:creationId xmlns:a16="http://schemas.microsoft.com/office/drawing/2014/main" xmlns="" id="{116FC827-7AC9-D54F-B2AE-71B1D0D4356C}"/>
+                      <a16:creationId xmlns:a16="http://schemas.microsoft.com/office/drawing/2014/main" id="{116FC827-7AC9-D54F-B2AE-71B1D0D4356C}"/>
                     </a:ext>
                   </a:extLst>
                 </p:cNvPr>
@@ -13404,7 +13400,7 @@
                 <p:cNvPr id="177" name="Elbow Connector 176">
                   <a:extLst>
                     <a:ext uri="{FF2B5EF4-FFF2-40B4-BE49-F238E27FC236}">
-                      <a16:creationId xmlns:a16="http://schemas.microsoft.com/office/drawing/2014/main" xmlns="" id="{BC64A19C-7046-AE4A-8E12-B9875D33E7CF}"/>
+                      <a16:creationId xmlns:a16="http://schemas.microsoft.com/office/drawing/2014/main" id="{BC64A19C-7046-AE4A-8E12-B9875D33E7CF}"/>
                     </a:ext>
                   </a:extLst>
                 </p:cNvPr>
@@ -13445,7 +13441,7 @@
                 <p:cNvPr id="178" name="Elbow Connector 177">
                   <a:extLst>
                     <a:ext uri="{FF2B5EF4-FFF2-40B4-BE49-F238E27FC236}">
-                      <a16:creationId xmlns:a16="http://schemas.microsoft.com/office/drawing/2014/main" xmlns="" id="{DC170DBD-E02E-0645-A581-6F546B607A6A}"/>
+                      <a16:creationId xmlns:a16="http://schemas.microsoft.com/office/drawing/2014/main" id="{DC170DBD-E02E-0645-A581-6F546B607A6A}"/>
                     </a:ext>
                   </a:extLst>
                 </p:cNvPr>
@@ -13486,7 +13482,7 @@
                 <p:cNvPr id="179" name="Elbow Connector 178">
                   <a:extLst>
                     <a:ext uri="{FF2B5EF4-FFF2-40B4-BE49-F238E27FC236}">
-                      <a16:creationId xmlns:a16="http://schemas.microsoft.com/office/drawing/2014/main" xmlns="" id="{9D0F1040-C941-2B4B-905A-8231550421F1}"/>
+                      <a16:creationId xmlns:a16="http://schemas.microsoft.com/office/drawing/2014/main" id="{9D0F1040-C941-2B4B-905A-8231550421F1}"/>
                     </a:ext>
                   </a:extLst>
                 </p:cNvPr>
@@ -13527,7 +13523,7 @@
                 <p:cNvPr id="180" name="Arrow: Down 81">
                   <a:extLst>
                     <a:ext uri="{FF2B5EF4-FFF2-40B4-BE49-F238E27FC236}">
-                      <a16:creationId xmlns:a16="http://schemas.microsoft.com/office/drawing/2014/main" xmlns="" id="{DF9C8DE6-C236-EE48-8077-3A2AC4C3E469}"/>
+                      <a16:creationId xmlns:a16="http://schemas.microsoft.com/office/drawing/2014/main" id="{DF9C8DE6-C236-EE48-8077-3A2AC4C3E469}"/>
                     </a:ext>
                   </a:extLst>
                 </p:cNvPr>
@@ -13582,7 +13578,7 @@
                 <p:cNvPr id="181" name="Picture 180">
                   <a:extLst>
                     <a:ext uri="{FF2B5EF4-FFF2-40B4-BE49-F238E27FC236}">
-                      <a16:creationId xmlns:a16="http://schemas.microsoft.com/office/drawing/2014/main" xmlns="" id="{A5C64DF8-EE3B-434D-8249-3084AD7CF17B}"/>
+                      <a16:creationId xmlns:a16="http://schemas.microsoft.com/office/drawing/2014/main" id="{A5C64DF8-EE3B-434D-8249-3084AD7CF17B}"/>
                     </a:ext>
                   </a:extLst>
                 </p:cNvPr>
@@ -13618,7 +13614,7 @@
                 <p:cNvPr id="182" name="Picture 181">
                   <a:extLst>
                     <a:ext uri="{FF2B5EF4-FFF2-40B4-BE49-F238E27FC236}">
-                      <a16:creationId xmlns:a16="http://schemas.microsoft.com/office/drawing/2014/main" xmlns="" id="{14F81D31-38BC-A542-A148-D23E0206ABBE}"/>
+                      <a16:creationId xmlns:a16="http://schemas.microsoft.com/office/drawing/2014/main" id="{14F81D31-38BC-A542-A148-D23E0206ABBE}"/>
                     </a:ext>
                   </a:extLst>
                 </p:cNvPr>
@@ -13658,7 +13654,7 @@
                 <p:cNvPr id="183" name="Rectangle 182">
                   <a:extLst>
                     <a:ext uri="{FF2B5EF4-FFF2-40B4-BE49-F238E27FC236}">
-                      <a16:creationId xmlns:a16="http://schemas.microsoft.com/office/drawing/2014/main" xmlns="" id="{1F273907-D5AC-6B4E-A12C-25A5222B2E88}"/>
+                      <a16:creationId xmlns:a16="http://schemas.microsoft.com/office/drawing/2014/main" id="{1F273907-D5AC-6B4E-A12C-25A5222B2E88}"/>
                     </a:ext>
                   </a:extLst>
                 </p:cNvPr>
@@ -13722,7 +13718,7 @@
                 <p:cNvPr id="184" name="Group 183">
                   <a:extLst>
                     <a:ext uri="{FF2B5EF4-FFF2-40B4-BE49-F238E27FC236}">
-                      <a16:creationId xmlns:a16="http://schemas.microsoft.com/office/drawing/2014/main" xmlns="" id="{61FE2C8F-7024-8D41-9C05-6425C99F4B6D}"/>
+                      <a16:creationId xmlns:a16="http://schemas.microsoft.com/office/drawing/2014/main" id="{61FE2C8F-7024-8D41-9C05-6425C99F4B6D}"/>
                     </a:ext>
                   </a:extLst>
                 </p:cNvPr>
@@ -13742,7 +13738,7 @@
                   <p:cNvPr id="229" name="Elbow Connector 228">
                     <a:extLst>
                       <a:ext uri="{FF2B5EF4-FFF2-40B4-BE49-F238E27FC236}">
-                        <a16:creationId xmlns:a16="http://schemas.microsoft.com/office/drawing/2014/main" xmlns="" id="{DE76D78D-8CA0-A34B-8B36-C12C3855C063}"/>
+                        <a16:creationId xmlns:a16="http://schemas.microsoft.com/office/drawing/2014/main" id="{DE76D78D-8CA0-A34B-8B36-C12C3855C063}"/>
                       </a:ext>
                     </a:extLst>
                   </p:cNvPr>
@@ -13783,7 +13779,7 @@
                   <p:cNvPr id="230" name="Elbow Connector 229">
                     <a:extLst>
                       <a:ext uri="{FF2B5EF4-FFF2-40B4-BE49-F238E27FC236}">
-                        <a16:creationId xmlns:a16="http://schemas.microsoft.com/office/drawing/2014/main" xmlns="" id="{E06EDEE7-E79F-D242-AFB1-524966507DF5}"/>
+                        <a16:creationId xmlns:a16="http://schemas.microsoft.com/office/drawing/2014/main" id="{E06EDEE7-E79F-D242-AFB1-524966507DF5}"/>
                       </a:ext>
                     </a:extLst>
                   </p:cNvPr>
@@ -13826,7 +13822,7 @@
                   <p:cNvPr id="231" name="Elbow Connector 230">
                     <a:extLst>
                       <a:ext uri="{FF2B5EF4-FFF2-40B4-BE49-F238E27FC236}">
-                        <a16:creationId xmlns:a16="http://schemas.microsoft.com/office/drawing/2014/main" xmlns="" id="{001CD2BB-F139-4946-8633-E7129E777845}"/>
+                        <a16:creationId xmlns:a16="http://schemas.microsoft.com/office/drawing/2014/main" id="{001CD2BB-F139-4946-8633-E7129E777845}"/>
                       </a:ext>
                     </a:extLst>
                   </p:cNvPr>
@@ -13869,7 +13865,7 @@
                   <p:cNvPr id="232" name="Elbow Connector 231">
                     <a:extLst>
                       <a:ext uri="{FF2B5EF4-FFF2-40B4-BE49-F238E27FC236}">
-                        <a16:creationId xmlns:a16="http://schemas.microsoft.com/office/drawing/2014/main" xmlns="" id="{E9B4859D-AA41-D94B-8865-E8F4A5E9201A}"/>
+                        <a16:creationId xmlns:a16="http://schemas.microsoft.com/office/drawing/2014/main" id="{E9B4859D-AA41-D94B-8865-E8F4A5E9201A}"/>
                       </a:ext>
                     </a:extLst>
                   </p:cNvPr>
@@ -13912,7 +13908,7 @@
                   <p:cNvPr id="233" name="Elbow Connector 232">
                     <a:extLst>
                       <a:ext uri="{FF2B5EF4-FFF2-40B4-BE49-F238E27FC236}">
-                        <a16:creationId xmlns:a16="http://schemas.microsoft.com/office/drawing/2014/main" xmlns="" id="{EA4371AF-C510-9447-866C-FA2152F51914}"/>
+                        <a16:creationId xmlns:a16="http://schemas.microsoft.com/office/drawing/2014/main" id="{EA4371AF-C510-9447-866C-FA2152F51914}"/>
                       </a:ext>
                     </a:extLst>
                   </p:cNvPr>
@@ -13956,7 +13952,7 @@
                 <p:cNvPr id="185" name="Arrow: Down 81">
                   <a:extLst>
                     <a:ext uri="{FF2B5EF4-FFF2-40B4-BE49-F238E27FC236}">
-                      <a16:creationId xmlns:a16="http://schemas.microsoft.com/office/drawing/2014/main" xmlns="" id="{1BFF8924-F086-F54C-8E85-B5D3363F8E74}"/>
+                      <a16:creationId xmlns:a16="http://schemas.microsoft.com/office/drawing/2014/main" id="{1BFF8924-F086-F54C-8E85-B5D3363F8E74}"/>
                     </a:ext>
                   </a:extLst>
                 </p:cNvPr>
@@ -14011,7 +14007,7 @@
                 <p:cNvPr id="186" name="Rectangle 185">
                   <a:extLst>
                     <a:ext uri="{FF2B5EF4-FFF2-40B4-BE49-F238E27FC236}">
-                      <a16:creationId xmlns:a16="http://schemas.microsoft.com/office/drawing/2014/main" xmlns="" id="{C29D49CD-F70D-B941-A935-CC7532E3C211}"/>
+                      <a16:creationId xmlns:a16="http://schemas.microsoft.com/office/drawing/2014/main" id="{C29D49CD-F70D-B941-A935-CC7532E3C211}"/>
                     </a:ext>
                   </a:extLst>
                 </p:cNvPr>
@@ -14063,7 +14059,7 @@
                 <p:cNvPr id="187" name="Rectangle 186">
                   <a:extLst>
                     <a:ext uri="{FF2B5EF4-FFF2-40B4-BE49-F238E27FC236}">
-                      <a16:creationId xmlns:a16="http://schemas.microsoft.com/office/drawing/2014/main" xmlns="" id="{6B4B2FC6-B34E-E14C-AAB5-91A1225D65F9}"/>
+                      <a16:creationId xmlns:a16="http://schemas.microsoft.com/office/drawing/2014/main" id="{6B4B2FC6-B34E-E14C-AAB5-91A1225D65F9}"/>
                     </a:ext>
                   </a:extLst>
                 </p:cNvPr>
@@ -14115,7 +14111,7 @@
                 <p:cNvPr id="188" name="Picture 187">
                   <a:extLst>
                     <a:ext uri="{FF2B5EF4-FFF2-40B4-BE49-F238E27FC236}">
-                      <a16:creationId xmlns:a16="http://schemas.microsoft.com/office/drawing/2014/main" xmlns="" id="{B3C195FE-953F-3940-9988-4B3634040E0C}"/>
+                      <a16:creationId xmlns:a16="http://schemas.microsoft.com/office/drawing/2014/main" id="{B3C195FE-953F-3940-9988-4B3634040E0C}"/>
                     </a:ext>
                   </a:extLst>
                 </p:cNvPr>
@@ -14151,7 +14147,7 @@
                 <p:cNvPr id="189" name="Group 188">
                   <a:extLst>
                     <a:ext uri="{FF2B5EF4-FFF2-40B4-BE49-F238E27FC236}">
-                      <a16:creationId xmlns:a16="http://schemas.microsoft.com/office/drawing/2014/main" xmlns="" id="{77FC2879-9058-BC43-B7FA-A78EC4E743C6}"/>
+                      <a16:creationId xmlns:a16="http://schemas.microsoft.com/office/drawing/2014/main" id="{77FC2879-9058-BC43-B7FA-A78EC4E743C6}"/>
                     </a:ext>
                   </a:extLst>
                 </p:cNvPr>
@@ -14171,7 +14167,7 @@
                   <p:cNvPr id="226" name="Picture 225">
                     <a:extLst>
                       <a:ext uri="{FF2B5EF4-FFF2-40B4-BE49-F238E27FC236}">
-                        <a16:creationId xmlns:a16="http://schemas.microsoft.com/office/drawing/2014/main" xmlns="" id="{677AE286-4A05-C74B-A277-B7C8F1333F72}"/>
+                        <a16:creationId xmlns:a16="http://schemas.microsoft.com/office/drawing/2014/main" id="{677AE286-4A05-C74B-A277-B7C8F1333F72}"/>
                       </a:ext>
                     </a:extLst>
                   </p:cNvPr>
@@ -14207,7 +14203,7 @@
                   <p:cNvPr id="227" name="Picture 226">
                     <a:extLst>
                       <a:ext uri="{FF2B5EF4-FFF2-40B4-BE49-F238E27FC236}">
-                        <a16:creationId xmlns:a16="http://schemas.microsoft.com/office/drawing/2014/main" xmlns="" id="{39E47AAB-4932-5D44-9F1B-F70FCA1AD131}"/>
+                        <a16:creationId xmlns:a16="http://schemas.microsoft.com/office/drawing/2014/main" id="{39E47AAB-4932-5D44-9F1B-F70FCA1AD131}"/>
                       </a:ext>
                     </a:extLst>
                   </p:cNvPr>
@@ -14243,7 +14239,7 @@
                   <p:cNvPr id="228" name="Picture 227">
                     <a:extLst>
                       <a:ext uri="{FF2B5EF4-FFF2-40B4-BE49-F238E27FC236}">
-                        <a16:creationId xmlns:a16="http://schemas.microsoft.com/office/drawing/2014/main" xmlns="" id="{03848DBF-E7A7-0549-A7CC-0D92DDB7F204}"/>
+                        <a16:creationId xmlns:a16="http://schemas.microsoft.com/office/drawing/2014/main" id="{03848DBF-E7A7-0549-A7CC-0D92DDB7F204}"/>
                       </a:ext>
                     </a:extLst>
                   </p:cNvPr>
@@ -14280,7 +14276,7 @@
                 <p:cNvPr id="190" name="Straight Connector 189">
                   <a:extLst>
                     <a:ext uri="{FF2B5EF4-FFF2-40B4-BE49-F238E27FC236}">
-                      <a16:creationId xmlns:a16="http://schemas.microsoft.com/office/drawing/2014/main" xmlns="" id="{37942414-129D-834B-87DD-62CA8F703269}"/>
+                      <a16:creationId xmlns:a16="http://schemas.microsoft.com/office/drawing/2014/main" id="{37942414-129D-834B-87DD-62CA8F703269}"/>
                     </a:ext>
                   </a:extLst>
                 </p:cNvPr>
@@ -14345,7 +14341,7 @@
                 <p:cNvPr id="191" name="Rectangle 190">
                   <a:extLst>
                     <a:ext uri="{FF2B5EF4-FFF2-40B4-BE49-F238E27FC236}">
-                      <a16:creationId xmlns:a16="http://schemas.microsoft.com/office/drawing/2014/main" xmlns="" id="{7E0F0C09-5560-064D-84F4-0D5D269B5EF4}"/>
+                      <a16:creationId xmlns:a16="http://schemas.microsoft.com/office/drawing/2014/main" id="{7E0F0C09-5560-064D-84F4-0D5D269B5EF4}"/>
                     </a:ext>
                   </a:extLst>
                 </p:cNvPr>
@@ -14414,7 +14410,7 @@
                 <p:cNvPr id="221" name="Rectangle 220">
                   <a:extLst>
                     <a:ext uri="{FF2B5EF4-FFF2-40B4-BE49-F238E27FC236}">
-                      <a16:creationId xmlns:a16="http://schemas.microsoft.com/office/drawing/2014/main" xmlns="" id="{67887162-218A-A94E-8723-7E3A38D3887B}"/>
+                      <a16:creationId xmlns:a16="http://schemas.microsoft.com/office/drawing/2014/main" id="{67887162-218A-A94E-8723-7E3A38D3887B}"/>
                     </a:ext>
                   </a:extLst>
                 </p:cNvPr>
@@ -14483,7 +14479,7 @@
                 <p:cNvPr id="222" name="Rectangle 221">
                   <a:extLst>
                     <a:ext uri="{FF2B5EF4-FFF2-40B4-BE49-F238E27FC236}">
-                      <a16:creationId xmlns:a16="http://schemas.microsoft.com/office/drawing/2014/main" xmlns="" id="{574F78D5-84BD-2147-82E2-67B0E8C03103}"/>
+                      <a16:creationId xmlns:a16="http://schemas.microsoft.com/office/drawing/2014/main" id="{574F78D5-84BD-2147-82E2-67B0E8C03103}"/>
                     </a:ext>
                   </a:extLst>
                 </p:cNvPr>
@@ -14552,7 +14548,7 @@
                 <p:cNvPr id="223" name="Group 222">
                   <a:extLst>
                     <a:ext uri="{FF2B5EF4-FFF2-40B4-BE49-F238E27FC236}">
-                      <a16:creationId xmlns:a16="http://schemas.microsoft.com/office/drawing/2014/main" xmlns="" id="{29558640-827B-1A45-8D7F-F0B6392377F4}"/>
+                      <a16:creationId xmlns:a16="http://schemas.microsoft.com/office/drawing/2014/main" id="{29558640-827B-1A45-8D7F-F0B6392377F4}"/>
                     </a:ext>
                   </a:extLst>
                 </p:cNvPr>
@@ -14572,7 +14568,7 @@
                   <p:cNvPr id="224" name="Picture 223">
                     <a:extLst>
                       <a:ext uri="{FF2B5EF4-FFF2-40B4-BE49-F238E27FC236}">
-                        <a16:creationId xmlns:a16="http://schemas.microsoft.com/office/drawing/2014/main" xmlns="" id="{7D605CEB-6CCF-174D-9A0C-5178FEDB61C3}"/>
+                        <a16:creationId xmlns:a16="http://schemas.microsoft.com/office/drawing/2014/main" id="{7D605CEB-6CCF-174D-9A0C-5178FEDB61C3}"/>
                       </a:ext>
                     </a:extLst>
                   </p:cNvPr>
@@ -14615,7 +14611,7 @@
                   <p:cNvPr id="225" name="Rectangle 224">
                     <a:extLst>
                       <a:ext uri="{FF2B5EF4-FFF2-40B4-BE49-F238E27FC236}">
-                        <a16:creationId xmlns:a16="http://schemas.microsoft.com/office/drawing/2014/main" xmlns="" id="{CD8A4BAA-AFEB-5C44-B8C7-AD0439728A06}"/>
+                        <a16:creationId xmlns:a16="http://schemas.microsoft.com/office/drawing/2014/main" id="{CD8A4BAA-AFEB-5C44-B8C7-AD0439728A06}"/>
                       </a:ext>
                     </a:extLst>
                   </p:cNvPr>
@@ -14672,7 +14668,7 @@
               <p:cNvPr id="169" name="Rectangle 168">
                 <a:extLst>
                   <a:ext uri="{FF2B5EF4-FFF2-40B4-BE49-F238E27FC236}">
-                    <a16:creationId xmlns:a16="http://schemas.microsoft.com/office/drawing/2014/main" xmlns="" id="{C638B7AD-1CCB-344B-90A7-6AD228607390}"/>
+                    <a16:creationId xmlns:a16="http://schemas.microsoft.com/office/drawing/2014/main" id="{C638B7AD-1CCB-344B-90A7-6AD228607390}"/>
                   </a:ext>
                 </a:extLst>
               </p:cNvPr>
@@ -14687,9 +14683,7 @@
               <a:prstGeom prst="rect">
                 <a:avLst/>
               </a:prstGeom>
-              <a:solidFill>
-                <a:schemeClr val="bg1"/>
-              </a:solidFill>
+              <a:noFill/>
               <a:effectLst/>
             </p:spPr>
             <p:txBody>
@@ -14725,7 +14719,7 @@
               <p:cNvPr id="170" name="Rectangle 169">
                 <a:extLst>
                   <a:ext uri="{FF2B5EF4-FFF2-40B4-BE49-F238E27FC236}">
-                    <a16:creationId xmlns:a16="http://schemas.microsoft.com/office/drawing/2014/main" xmlns="" id="{029B660A-EF35-7F47-B2E4-6388AAA8773F}"/>
+                    <a16:creationId xmlns:a16="http://schemas.microsoft.com/office/drawing/2014/main" id="{029B660A-EF35-7F47-B2E4-6388AAA8773F}"/>
                   </a:ext>
                 </a:extLst>
               </p:cNvPr>
@@ -14740,9 +14734,7 @@
               <a:prstGeom prst="rect">
                 <a:avLst/>
               </a:prstGeom>
-              <a:solidFill>
-                <a:schemeClr val="bg1"/>
-              </a:solidFill>
+              <a:noFill/>
               <a:effectLst/>
             </p:spPr>
             <p:txBody>
@@ -14757,7 +14749,7 @@
                   </a:lnSpc>
                 </a:pPr>
                 <a:r>
-                  <a:rPr lang="en-US" sz="1100" b="1" dirty="0" smtClean="0">
+                  <a:rPr lang="en-US" sz="1100" b="1" dirty="0">
                     <a:ln w="0"/>
                     <a:solidFill>
                       <a:schemeClr val="tx1">
@@ -14771,18 +14763,6 @@
                   </a:rPr>
                   <a:t>VEE PORT</a:t>
                 </a:r>
-                <a:endParaRPr lang="en-US" sz="1100" b="1" dirty="0">
-                  <a:ln w="0"/>
-                  <a:solidFill>
-                    <a:schemeClr val="tx1">
-                      <a:lumMod val="60000"/>
-                      <a:lumOff val="40000"/>
-                    </a:schemeClr>
-                  </a:solidFill>
-                  <a:latin typeface="Source Sans Pro" charset="0"/>
-                  <a:ea typeface="Source Sans Pro" charset="0"/>
-                  <a:cs typeface="Source Sans Pro" charset="0"/>
-                </a:endParaRPr>
               </a:p>
             </p:txBody>
           </p:sp>
@@ -14791,7 +14771,7 @@
               <p:cNvPr id="171" name="Rectangle 170">
                 <a:extLst>
                   <a:ext uri="{FF2B5EF4-FFF2-40B4-BE49-F238E27FC236}">
-                    <a16:creationId xmlns:a16="http://schemas.microsoft.com/office/drawing/2014/main" xmlns="" id="{5C366557-F60D-8B4C-BB9C-4D09899ED066}"/>
+                    <a16:creationId xmlns:a16="http://schemas.microsoft.com/office/drawing/2014/main" id="{5C366557-F60D-8B4C-BB9C-4D09899ED066}"/>
                   </a:ext>
                 </a:extLst>
               </p:cNvPr>
@@ -14806,9 +14786,7 @@
               <a:prstGeom prst="rect">
                 <a:avLst/>
               </a:prstGeom>
-              <a:solidFill>
-                <a:schemeClr val="bg1"/>
-              </a:solidFill>
+              <a:noFill/>
               <a:effectLst/>
             </p:spPr>
             <p:txBody>
@@ -14842,7 +14820,7 @@
               <p:cNvPr id="172" name="Rectangle 171">
                 <a:extLst>
                   <a:ext uri="{FF2B5EF4-FFF2-40B4-BE49-F238E27FC236}">
-                    <a16:creationId xmlns:a16="http://schemas.microsoft.com/office/drawing/2014/main" xmlns="" id="{6279CB0B-90EE-E949-B2CD-7BD3106D5A65}"/>
+                    <a16:creationId xmlns:a16="http://schemas.microsoft.com/office/drawing/2014/main" id="{6279CB0B-90EE-E949-B2CD-7BD3106D5A65}"/>
                   </a:ext>
                 </a:extLst>
               </p:cNvPr>
@@ -14857,9 +14835,7 @@
               <a:prstGeom prst="rect">
                 <a:avLst/>
               </a:prstGeom>
-              <a:solidFill>
-                <a:schemeClr val="bg1"/>
-              </a:solidFill>
+              <a:noFill/>
               <a:effectLst/>
             </p:spPr>
             <p:txBody>
@@ -14896,7 +14872,7 @@
           <p:cNvPr id="234" name="Rounded Rectangle 233">
             <a:extLst>
               <a:ext uri="{FF2B5EF4-FFF2-40B4-BE49-F238E27FC236}">
-                <a16:creationId xmlns:a16="http://schemas.microsoft.com/office/drawing/2014/main" xmlns="" id="{141AB4C3-853E-1440-9794-8C4C6FF706CF}"/>
+                <a16:creationId xmlns:a16="http://schemas.microsoft.com/office/drawing/2014/main" id="{141AB4C3-853E-1440-9794-8C4C6FF706CF}"/>
               </a:ext>
             </a:extLst>
           </p:cNvPr>
@@ -14961,6 +14937,107 @@
           </a:p>
         </p:txBody>
       </p:sp>
+      <p:sp>
+        <p:nvSpPr>
+          <p:cNvPr id="2" name="Rectangle 1">
+            <a:extLst>
+              <a:ext uri="{FF2B5EF4-FFF2-40B4-BE49-F238E27FC236}">
+                <a16:creationId xmlns:a16="http://schemas.microsoft.com/office/drawing/2014/main" id="{4D3A4281-687C-78DA-B9C7-33C1CC539A72}"/>
+              </a:ext>
+            </a:extLst>
+          </p:cNvPr>
+          <p:cNvSpPr/>
+          <p:nvPr/>
+        </p:nvSpPr>
+        <p:spPr>
+          <a:xfrm>
+            <a:off x="10192481" y="5560280"/>
+            <a:ext cx="943910" cy="213954"/>
+          </a:xfrm>
+          <a:prstGeom prst="rect">
+            <a:avLst/>
+          </a:prstGeom>
+          <a:noFill/>
+          <a:effectLst/>
+        </p:spPr>
+        <p:txBody>
+          <a:bodyPr wrap="square" lIns="0" rIns="0">
+            <a:noAutofit/>
+          </a:bodyPr>
+          <a:lstStyle/>
+          <a:p>
+            <a:pPr algn="r">
+              <a:lnSpc>
+                <a:spcPts val="1300"/>
+              </a:lnSpc>
+            </a:pPr>
+            <a:r>
+              <a:rPr lang="en-US" sz="1100" b="1" dirty="0">
+                <a:ln w="0"/>
+                <a:solidFill>
+                  <a:schemeClr val="tx1">
+                    <a:lumMod val="60000"/>
+                    <a:lumOff val="40000"/>
+                  </a:schemeClr>
+                </a:solidFill>
+                <a:latin typeface="Source Sans Pro" charset="0"/>
+                <a:ea typeface="Source Sans Pro" charset="0"/>
+                <a:cs typeface="Source Sans Pro" charset="0"/>
+              </a:rPr>
+              <a:t>VEE PORT</a:t>
+            </a:r>
+          </a:p>
+        </p:txBody>
+      </p:sp>
+      <p:sp>
+        <p:nvSpPr>
+          <p:cNvPr id="3" name="Rectangle 2">
+            <a:extLst>
+              <a:ext uri="{FF2B5EF4-FFF2-40B4-BE49-F238E27FC236}">
+                <a16:creationId xmlns:a16="http://schemas.microsoft.com/office/drawing/2014/main" id="{89FA4BE7-4C6D-1E83-FC86-97A0DA1B83AB}"/>
+              </a:ext>
+            </a:extLst>
+          </p:cNvPr>
+          <p:cNvSpPr/>
+          <p:nvPr/>
+        </p:nvSpPr>
+        <p:spPr>
+          <a:xfrm>
+            <a:off x="9712130" y="3816698"/>
+            <a:ext cx="1424261" cy="213954"/>
+          </a:xfrm>
+          <a:prstGeom prst="rect">
+            <a:avLst/>
+          </a:prstGeom>
+          <a:noFill/>
+          <a:effectLst/>
+        </p:spPr>
+        <p:txBody>
+          <a:bodyPr wrap="square" lIns="0" rIns="0">
+            <a:noAutofit/>
+          </a:bodyPr>
+          <a:lstStyle/>
+          <a:p>
+            <a:pPr algn="r">
+              <a:lnSpc>
+                <a:spcPts val="1300"/>
+              </a:lnSpc>
+            </a:pPr>
+            <a:r>
+              <a:rPr lang="en-US" sz="1100" b="1" dirty="0">
+                <a:ln w="0"/>
+                <a:solidFill>
+                  <a:schemeClr val="accent1"/>
+                </a:solidFill>
+                <a:latin typeface="Source Sans Pro" charset="0"/>
+                <a:ea typeface="Source Sans Pro" charset="0"/>
+                <a:cs typeface="Source Sans Pro" charset="0"/>
+              </a:rPr>
+              <a:t>VIRTUALIZATION</a:t>
+            </a:r>
+          </a:p>
+        </p:txBody>
+      </p:sp>
     </p:spTree>
     <p:extLst>
       <p:ext uri="{BB962C8B-B14F-4D97-AF65-F5344CB8AC3E}">
@@ -14971,13 +15048,6 @@
   <p:clrMapOvr>
     <a:masterClrMapping/>
   </p:clrMapOvr>
-  <p:timing>
-    <p:tnLst>
-      <p:par>
-        <p:cTn id="1" dur="indefinite" restart="never" nodeType="tmRoot"/>
-      </p:par>
-    </p:tnLst>
-  </p:timing>
 </p:sld>
 </file>
 

</xml_diff>